<commit_message>
Completed initial rewrite for the 06.14.19 presentation.
</commit_message>
<xml_diff>
--- a/_toothpaste/toothpaste_story_clinic.pptx
+++ b/_toothpaste/toothpaste_story_clinic.pptx
@@ -212,7 +212,7 @@
           <a:p>
             <a:fld id="{AE6EAB43-FDD5-4DA5-A2FD-96DC022D7B5C}" type="datetimeFigureOut">
               <a:rPr lang="en-US" smtClean="0"/>
-              <a:t>6/9/2019</a:t>
+              <a:t>6/10/2019</a:t>
             </a:fld>
             <a:endParaRPr lang="en-US"/>
           </a:p>
@@ -524,7 +524,7 @@
           <a:bodyPr/>
           <a:lstStyle/>
           <a:p>
-            <a:endParaRPr lang="en-US"/>
+            <a:endParaRPr lang="en-US" dirty="0"/>
           </a:p>
         </p:txBody>
       </p:sp>
@@ -610,11 +610,11 @@
           <a:p>
             <a:r>
               <a:rPr lang="en-US" dirty="0" smtClean="0"/>
-              <a:t>Before moving</a:t>
+              <a:t>In our last slide, I introduced the idea of sampling.</a:t>
             </a:r>
             <a:r>
               <a:rPr lang="en-US" baseline="0" dirty="0" smtClean="0"/>
-              <a:t> on, I must first introduce you to the “Variance Monster.”  Here’s the problem.  Every sample we take is going to vary from every other sample from a given population.  Let’s visualize the problem.  To do so, I’m going to conduct a simulation using a special Excel spreadsheet developed by Geoff Cummings, the author of </a:t>
+              <a:t>  But there’s a big gotcha here.  Here’s the problem.  Every sample we take is going to vary from every other sample taken from a given population.  Let’s visualize the problem.  To do so, I’m going to conduct a simulation using a special Excel spreadsheet developed by Geoff Cummings, the author of </a:t>
             </a:r>
             <a:r>
               <a:rPr lang="en-US" u="sng" baseline="0" dirty="0" smtClean="0"/>
@@ -1203,7 +1203,7 @@
             </a:r>
             <a:r>
               <a:rPr lang="en-US" baseline="0" dirty="0" smtClean="0"/>
-              <a:t>  To bolster our argument that SnF infused toothpaste is effective, we could run additional studies or find others which compare it to regular toothpaste.  We could then conduct a </a:t>
+              <a:t>  To bolster our argument that SnF infused toothpaste is effective, we could run additional studies or find others which compare it to regular toothpaste.  Then, we could conduct a </a:t>
             </a:r>
             <a:r>
               <a:rPr lang="en-US" b="1" baseline="0" dirty="0" smtClean="0"/>
@@ -1211,13 +1211,8 @@
             </a:r>
             <a:r>
               <a:rPr lang="en-US" baseline="0" dirty="0" smtClean="0"/>
-              <a:t> to arrive at an overall conclusion</a:t>
-            </a:r>
-            <a:r>
-              <a:rPr lang="en-US" baseline="0" dirty="0" smtClean="0"/>
-              <a:t>.  As this topic is beyond the scope of today’s presentation, let’s continue…</a:t>
-            </a:r>
-            <a:endParaRPr lang="en-US" baseline="0" dirty="0" smtClean="0"/>
+              <a:t> to arrive at an overall conclusion.  As this topic is beyond the scope of today’s presentation, let’s continue…</a:t>
+            </a:r>
           </a:p>
         </p:txBody>
       </p:sp>
@@ -1340,9 +1335,80 @@
             </a:r>
             <a:r>
               <a:rPr lang="en-US" baseline="0" dirty="0" smtClean="0"/>
-              <a:t> difference between our control and SnF groups.  In the case of traditional NHST, this is done by calculating a p-value.  However, this leads to binary (yes/no) thinking.  P is significant, typically less than .05, or it isn’t – in which case a research journal will probably not wish to publish the findings. And besides, as we saw in our first ESCI simulation, a point estimate can vary greatly, thanks to the Chance Monster.  The problem is that NHST gives us an illusion of certainty whereas the reality is much more nuanced, a continuum of possibilities.</a:t>
-            </a:r>
-            <a:endParaRPr lang="en-US" dirty="0" smtClean="0"/>
+              <a:t> difference between our control and </a:t>
+            </a:r>
+            <a:r>
+              <a:rPr lang="en-US" baseline="0" dirty="0" err="1" smtClean="0"/>
+              <a:t>SnF</a:t>
+            </a:r>
+            <a:r>
+              <a:rPr lang="en-US" baseline="0" dirty="0" smtClean="0"/>
+              <a:t> group.  In the case of traditional NHST, this is done by calculating a p-value.  However, this leads to binary (yes/no) thinking.  P is significant, typically less than .05, or it isn’t – in which case a research journal will probably </a:t>
+            </a:r>
+            <a:r>
+              <a:rPr lang="en-US" baseline="0" smtClean="0"/>
+              <a:t>not </a:t>
+            </a:r>
+            <a:r>
+              <a:rPr lang="en-US" baseline="0" smtClean="0"/>
+              <a:t>publish </a:t>
+            </a:r>
+            <a:r>
+              <a:rPr lang="en-US" baseline="0" dirty="0" smtClean="0"/>
+              <a:t>the findings. And besides, as we saw in our first ESCI simulation, a point estimate can vary greatly, thanks to chance.  The problem is that NHST gives us an illusion of certainty whereas the reality is much more nuanced.  </a:t>
+            </a:r>
+          </a:p>
+          <a:p>
+            <a:pPr marL="0" marR="0" lvl="0" indent="0" algn="l" defTabSz="914400" rtl="0" eaLnBrk="1" fontAlgn="auto" latinLnBrk="0" hangingPunct="1">
+              <a:lnSpc>
+                <a:spcPct val="100000"/>
+              </a:lnSpc>
+              <a:spcBef>
+                <a:spcPts val="0"/>
+              </a:spcBef>
+              <a:spcAft>
+                <a:spcPts val="0"/>
+              </a:spcAft>
+              <a:buClrTx/>
+              <a:buSzTx/>
+              <a:buFontTx/>
+              <a:buNone/>
+              <a:tabLst/>
+              <a:defRPr/>
+            </a:pPr>
+            <a:endParaRPr lang="en-US" baseline="0" dirty="0" smtClean="0"/>
+          </a:p>
+          <a:p>
+            <a:pPr marL="0" marR="0" lvl="0" indent="0" algn="l" defTabSz="914400" rtl="0" eaLnBrk="1" fontAlgn="auto" latinLnBrk="0" hangingPunct="1">
+              <a:lnSpc>
+                <a:spcPct val="100000"/>
+              </a:lnSpc>
+              <a:spcBef>
+                <a:spcPts val="0"/>
+              </a:spcBef>
+              <a:spcAft>
+                <a:spcPts val="0"/>
+              </a:spcAft>
+              <a:buClrTx/>
+              <a:buSzTx/>
+              <a:buFontTx/>
+              <a:buNone/>
+              <a:tabLst/>
+              <a:defRPr/>
+            </a:pPr>
+            <a:r>
+              <a:rPr lang="en-US" baseline="0" dirty="0" smtClean="0"/>
+              <a:t>Let’s take a look at the difference between our control and treatment groups from a confidence interval point-of-view.  The numbers in ESCI are for the gingival index at 3 months.  (ESCI – Click on </a:t>
+            </a:r>
+            <a:r>
+              <a:rPr lang="en-US" b="1" baseline="0" dirty="0" smtClean="0"/>
+              <a:t>Summary Two</a:t>
+            </a:r>
+            <a:r>
+              <a:rPr lang="en-US" b="0" baseline="0" dirty="0" smtClean="0"/>
+              <a:t>)  The farther apart the two groups are from each other, the lower the p value.  A large difference is strong evidence against the possibility of this outcome being due to chance.</a:t>
+            </a:r>
+            <a:endParaRPr lang="en-US" b="0" dirty="0" smtClean="0"/>
           </a:p>
           <a:p>
             <a:endParaRPr lang="en-US" dirty="0"/>
@@ -1497,7 +1563,15 @@
             </a:r>
             <a:r>
               <a:rPr lang="en-US" dirty="0"/>
-              <a:t> error in 5% of cases. To reduce that risk, we would simply reduce the alpha level to possibly 1% or lower. But doing so comes at a cost - we must increase the number of study participants which, in turn, increases the cost of the research project.</a:t>
+              <a:t> error in 5% of cases. To reduce that risk, we would simply reduce the alpha level to possibly 1% or lower. But doing so comes at a cost - we must increase the number of study participants which, in turn, increases the cost of the </a:t>
+            </a:r>
+            <a:r>
+              <a:rPr lang="en-US" dirty="0" smtClean="0"/>
+              <a:t>project</a:t>
+            </a:r>
+            <a:r>
+              <a:rPr lang="en-US" dirty="0"/>
+              <a:t>.</a:t>
             </a:r>
           </a:p>
           <a:p>
@@ -3354,7 +3428,7 @@
           <a:p>
             <a:fld id="{96DFF08F-DC6B-4601-B491-B0F83F6DD2DA}" type="datetimeFigureOut">
               <a:rPr lang="en-US" smtClean="0"/>
-              <a:t>6/9/2019</a:t>
+              <a:t>6/10/2019</a:t>
             </a:fld>
             <a:endParaRPr lang="en-US" dirty="0"/>
           </a:p>
@@ -3606,7 +3680,7 @@
             <a:fld id="{96DFF08F-DC6B-4601-B491-B0F83F6DD2DA}" type="datetimeFigureOut">
               <a:rPr lang="en-US" smtClean="0"/>
               <a:pPr/>
-              <a:t>6/9/2019</a:t>
+              <a:t>6/10/2019</a:t>
             </a:fld>
             <a:endParaRPr lang="en-US" dirty="0"/>
           </a:p>
@@ -3922,7 +3996,7 @@
             <a:fld id="{96DFF08F-DC6B-4601-B491-B0F83F6DD2DA}" type="datetimeFigureOut">
               <a:rPr lang="en-US" smtClean="0"/>
               <a:pPr/>
-              <a:t>6/9/2019</a:t>
+              <a:t>6/10/2019</a:t>
             </a:fld>
             <a:endParaRPr lang="en-US" dirty="0"/>
           </a:p>
@@ -4257,7 +4331,7 @@
             <a:fld id="{96DFF08F-DC6B-4601-B491-B0F83F6DD2DA}" type="datetimeFigureOut">
               <a:rPr lang="en-US" smtClean="0"/>
               <a:pPr/>
-              <a:t>6/9/2019</a:t>
+              <a:t>6/10/2019</a:t>
             </a:fld>
             <a:endParaRPr lang="en-US" dirty="0"/>
           </a:p>
@@ -4573,7 +4647,7 @@
             <a:fld id="{96DFF08F-DC6B-4601-B491-B0F83F6DD2DA}" type="datetimeFigureOut">
               <a:rPr lang="en-US" smtClean="0"/>
               <a:pPr/>
-              <a:t>6/9/2019</a:t>
+              <a:t>6/10/2019</a:t>
             </a:fld>
             <a:endParaRPr lang="en-US" dirty="0"/>
           </a:p>
@@ -4968,7 +5042,7 @@
             <a:fld id="{96DFF08F-DC6B-4601-B491-B0F83F6DD2DA}" type="datetimeFigureOut">
               <a:rPr lang="en-US" smtClean="0"/>
               <a:pPr/>
-              <a:t>6/9/2019</a:t>
+              <a:t>6/10/2019</a:t>
             </a:fld>
             <a:endParaRPr lang="en-US" dirty="0"/>
           </a:p>
@@ -5139,7 +5213,7 @@
           <a:p>
             <a:fld id="{96DFF08F-DC6B-4601-B491-B0F83F6DD2DA}" type="datetimeFigureOut">
               <a:rPr lang="en-US" smtClean="0"/>
-              <a:t>6/9/2019</a:t>
+              <a:t>6/10/2019</a:t>
             </a:fld>
             <a:endParaRPr lang="en-US" dirty="0"/>
           </a:p>
@@ -5319,7 +5393,7 @@
           <a:p>
             <a:fld id="{96DFF08F-DC6B-4601-B491-B0F83F6DD2DA}" type="datetimeFigureOut">
               <a:rPr lang="en-US" smtClean="0"/>
-              <a:t>6/9/2019</a:t>
+              <a:t>6/10/2019</a:t>
             </a:fld>
             <a:endParaRPr lang="en-US" dirty="0"/>
           </a:p>
@@ -5489,7 +5563,7 @@
           <a:p>
             <a:fld id="{96DFF08F-DC6B-4601-B491-B0F83F6DD2DA}" type="datetimeFigureOut">
               <a:rPr lang="en-US" smtClean="0"/>
-              <a:t>6/9/2019</a:t>
+              <a:t>6/10/2019</a:t>
             </a:fld>
             <a:endParaRPr lang="en-US" dirty="0"/>
           </a:p>
@@ -5736,7 +5810,7 @@
           <a:p>
             <a:fld id="{96DFF08F-DC6B-4601-B491-B0F83F6DD2DA}" type="datetimeFigureOut">
               <a:rPr lang="en-US" smtClean="0"/>
-              <a:t>6/9/2019</a:t>
+              <a:t>6/10/2019</a:t>
             </a:fld>
             <a:endParaRPr lang="en-US" dirty="0"/>
           </a:p>
@@ -5968,7 +6042,7 @@
           <a:p>
             <a:fld id="{96DFF08F-DC6B-4601-B491-B0F83F6DD2DA}" type="datetimeFigureOut">
               <a:rPr lang="en-US" smtClean="0"/>
-              <a:t>6/9/2019</a:t>
+              <a:t>6/10/2019</a:t>
             </a:fld>
             <a:endParaRPr lang="en-US" dirty="0"/>
           </a:p>
@@ -6342,7 +6416,7 @@
           <a:p>
             <a:fld id="{96DFF08F-DC6B-4601-B491-B0F83F6DD2DA}" type="datetimeFigureOut">
               <a:rPr lang="en-US" smtClean="0"/>
-              <a:t>6/9/2019</a:t>
+              <a:t>6/10/2019</a:t>
             </a:fld>
             <a:endParaRPr lang="en-US" dirty="0"/>
           </a:p>
@@ -6465,7 +6539,7 @@
           <a:p>
             <a:fld id="{96DFF08F-DC6B-4601-B491-B0F83F6DD2DA}" type="datetimeFigureOut">
               <a:rPr lang="en-US" smtClean="0"/>
-              <a:t>6/9/2019</a:t>
+              <a:t>6/10/2019</a:t>
             </a:fld>
             <a:endParaRPr lang="en-US" dirty="0"/>
           </a:p>
@@ -6560,7 +6634,7 @@
           <a:p>
             <a:fld id="{96DFF08F-DC6B-4601-B491-B0F83F6DD2DA}" type="datetimeFigureOut">
               <a:rPr lang="en-US" smtClean="0"/>
-              <a:t>6/9/2019</a:t>
+              <a:t>6/10/2019</a:t>
             </a:fld>
             <a:endParaRPr lang="en-US" dirty="0"/>
           </a:p>
@@ -6815,7 +6889,7 @@
           <a:p>
             <a:fld id="{96DFF08F-DC6B-4601-B491-B0F83F6DD2DA}" type="datetimeFigureOut">
               <a:rPr lang="en-US" smtClean="0"/>
-              <a:t>6/9/2019</a:t>
+              <a:t>6/10/2019</a:t>
             </a:fld>
             <a:endParaRPr lang="en-US" dirty="0"/>
           </a:p>
@@ -7120,7 +7194,7 @@
           <a:p>
             <a:fld id="{96DFF08F-DC6B-4601-B491-B0F83F6DD2DA}" type="datetimeFigureOut">
               <a:rPr lang="en-US" smtClean="0"/>
-              <a:t>6/9/2019</a:t>
+              <a:t>6/10/2019</a:t>
             </a:fld>
             <a:endParaRPr lang="en-US" dirty="0"/>
           </a:p>
@@ -7823,7 +7897,7 @@
             <a:fld id="{96DFF08F-DC6B-4601-B491-B0F83F6DD2DA}" type="datetimeFigureOut">
               <a:rPr lang="en-US" smtClean="0"/>
               <a:pPr/>
-              <a:t>6/9/2019</a:t>
+              <a:t>6/10/2019</a:t>
             </a:fld>
             <a:endParaRPr lang="en-US" dirty="0"/>
           </a:p>
@@ -8513,8 +8587,8 @@
         </p:nvSpPr>
         <p:spPr>
           <a:xfrm>
-            <a:off x="5050156" y="5262372"/>
-            <a:ext cx="4331969" cy="414528"/>
+            <a:off x="4796446" y="5262371"/>
+            <a:ext cx="4918190" cy="440159"/>
           </a:xfrm>
           <a:prstGeom prst="rect">
             <a:avLst/>
@@ -8522,7 +8596,7 @@
         </p:spPr>
         <p:txBody>
           <a:bodyPr vert="horz" lIns="91440" tIns="45720" rIns="91440" bIns="45720" rtlCol="0">
-            <a:normAutofit/>
+            <a:normAutofit fontScale="85000" lnSpcReduction="10000"/>
           </a:bodyPr>
           <a:lstStyle>
             <a:lvl1pPr marL="342900" indent="-342900" algn="l" defTabSz="457200" rtl="0" eaLnBrk="1" latinLnBrk="0" hangingPunct="1">
@@ -8761,15 +8835,7 @@
                   <a:srgbClr val="00B0F0"/>
                 </a:solidFill>
               </a:rPr>
-              <a:t>Say “Hello” to the </a:t>
-            </a:r>
-            <a:r>
-              <a:rPr lang="en-US" sz="2000" dirty="0" smtClean="0">
-                <a:solidFill>
-                  <a:srgbClr val="00B0F0"/>
-                </a:solidFill>
-              </a:rPr>
-              <a:t>Chance Monster</a:t>
+              <a:t>Say “Hello” to the Chance &amp; Variance Monster</a:t>
             </a:r>
           </a:p>
           <a:p>

</xml_diff>

<commit_message>
Modified the slide order.
</commit_message>
<xml_diff>
--- a/_toothpaste/toothpaste_story_clinic.pptx
+++ b/_toothpaste/toothpaste_story_clinic.pptx
@@ -17,10 +17,10 @@
     <p:sldId id="264" r:id="rId8"/>
     <p:sldId id="262" r:id="rId9"/>
     <p:sldId id="265" r:id="rId10"/>
-    <p:sldId id="272" r:id="rId11"/>
-    <p:sldId id="271" r:id="rId12"/>
-    <p:sldId id="267" r:id="rId13"/>
-    <p:sldId id="268" r:id="rId14"/>
+    <p:sldId id="267" r:id="rId11"/>
+    <p:sldId id="268" r:id="rId12"/>
+    <p:sldId id="272" r:id="rId13"/>
+    <p:sldId id="271" r:id="rId14"/>
     <p:sldId id="269" r:id="rId15"/>
     <p:sldId id="266" r:id="rId16"/>
     <p:sldId id="270" r:id="rId17"/>
@@ -212,7 +212,7 @@
           <a:p>
             <a:fld id="{AE6EAB43-FDD5-4DA5-A2FD-96DC022D7B5C}" type="datetimeFigureOut">
               <a:rPr lang="en-US" smtClean="0"/>
-              <a:t>6/10/2019</a:t>
+              <a:t>6/12/2019</a:t>
             </a:fld>
             <a:endParaRPr lang="en-US"/>
           </a:p>
@@ -609,74 +609,131 @@
           <a:lstStyle/>
           <a:p>
             <a:r>
+              <a:rPr lang="en-US" baseline="0" dirty="0" smtClean="0"/>
+              <a:t>With a basic understanding of research logic in-hand,</a:t>
+            </a:r>
+            <a:r>
               <a:rPr lang="en-US" dirty="0" smtClean="0"/>
-              <a:t>In our last slide, I introduced the idea of sampling.</a:t>
+              <a:t> </a:t>
+            </a:r>
+            <a:r>
+              <a:rPr lang="en-US" dirty="0" smtClean="0"/>
+              <a:t>let’s take a look at some data from an actual study.  These</a:t>
             </a:r>
             <a:r>
               <a:rPr lang="en-US" baseline="0" dirty="0" smtClean="0"/>
-              <a:t>  But there’s a big gotcha here.  Here’s the problem.  Every sample we take is going to vary from every other sample taken from a given population.  Let’s visualize the problem.  To do so, I’m going to conduct a simulation using a special Excel spreadsheet developed by Geoff Cummings, the author of </a:t>
-            </a:r>
-            <a:r>
-              <a:rPr lang="en-US" u="sng" baseline="0" dirty="0" smtClean="0"/>
-              <a:t>Introduction to the New Statistics</a:t>
+              <a:t> tables are from an article by </a:t>
+            </a:r>
+            <a:r>
+              <a:rPr lang="en-US" baseline="0" dirty="0" err="1" smtClean="0"/>
+              <a:t>Mallett</a:t>
             </a:r>
             <a:r>
               <a:rPr lang="en-US" baseline="0" dirty="0" smtClean="0"/>
-              <a:t>.</a:t>
-            </a:r>
-          </a:p>
-          <a:p>
-            <a:endParaRPr lang="en-US" baseline="0" dirty="0" smtClean="0"/>
-          </a:p>
-          <a:p>
+              <a:t>, et al., published in 2007 in the </a:t>
+            </a:r>
+            <a:r>
+              <a:rPr lang="en-US" i="1" dirty="0" smtClean="0"/>
+              <a:t>Journal of Clinical Periodontology.</a:t>
+            </a:r>
+            <a:r>
+              <a:rPr lang="en-US" i="1" baseline="0" dirty="0" smtClean="0"/>
+              <a:t>  </a:t>
+            </a:r>
+            <a:r>
+              <a:rPr lang="en-US" i="0" baseline="0" dirty="0" smtClean="0"/>
+              <a:t>A complete reference is provided at the end of this presentation</a:t>
+            </a:r>
+            <a:r>
+              <a:rPr lang="en-US" i="0" baseline="0" dirty="0" smtClean="0"/>
+              <a:t>.  As suggested in the previous slide, we see that these authors selected two indices.  The first measures the participant’s overall gingival health, the second measures gingival bleeding.  Note: smaller numbers are better.</a:t>
+            </a:r>
+            <a:endParaRPr lang="en-US" dirty="0" smtClean="0"/>
+          </a:p>
+          <a:p>
+            <a:endParaRPr lang="en-US" dirty="0" smtClean="0"/>
+          </a:p>
+          <a:p>
+            <a:r>
+              <a:rPr lang="en-US" dirty="0" smtClean="0"/>
+              <a:t>Let's </a:t>
+            </a:r>
+            <a:r>
+              <a:rPr lang="en-US" dirty="0"/>
+              <a:t>briefly review some basic statistics vocabulary. </a:t>
+            </a:r>
+            <a:r>
+              <a:rPr lang="en-US" i="1" dirty="0"/>
+              <a:t>N</a:t>
+            </a:r>
+            <a:r>
+              <a:rPr lang="en-US" dirty="0"/>
+              <a:t> is the number of observations. From the two tables, we see that the sample size for the two groups differs by 2. SD stands for Standard Deviation, a measure of the spread of the data about the mean. In a normal distribution, 68% of the scores are within 1 SD of the mean, 95% within 2 SDs, and 99% within 3 SDs. Unfortunately, we don't have time in this session to delve into the details. And finally, </a:t>
+            </a:r>
+            <a:r>
+              <a:rPr lang="en-US" dirty="0" smtClean="0"/>
+              <a:t>the mean is</a:t>
+            </a:r>
             <a:r>
               <a:rPr lang="en-US" baseline="0" dirty="0" smtClean="0"/>
-              <a:t>Run simulation with the ESCI </a:t>
-            </a:r>
-            <a:r>
-              <a:rPr lang="en-US" baseline="0" dirty="0" err="1" smtClean="0"/>
-              <a:t>Cijumping</a:t>
-            </a:r>
-            <a:r>
-              <a:rPr lang="en-US" baseline="0" dirty="0" smtClean="0"/>
-              <a:t> tab.  Click on Mean Heap at Red 5.  Turn off Confidence Intervals at Red 6.</a:t>
-            </a:r>
-          </a:p>
-          <a:p>
-            <a:endParaRPr lang="en-US" baseline="0" dirty="0" smtClean="0"/>
-          </a:p>
-          <a:p>
-            <a:r>
-              <a:rPr lang="en-US" baseline="0" dirty="0" smtClean="0"/>
-              <a:t>This is very interesting.  The sample means fall mainly within the two lines which delimit our margin of error.  However, there’s a lot of variability here.  A few sample means fall outside our two lines and are thus poor estimates of the population mean (parameter).  On the other hand, other samples fall close to the true mean.  So how do we communicate this sample variation?  How do we add a certain level of </a:t>
-            </a:r>
-            <a:r>
-              <a:rPr lang="en-US" b="1" u="sng" baseline="0" dirty="0" smtClean="0">
-                <a:effectLst/>
-              </a:rPr>
-              <a:t>fuzziness</a:t>
-            </a:r>
-            <a:r>
-              <a:rPr lang="en-US" baseline="0" dirty="0" smtClean="0">
-                <a:effectLst/>
-              </a:rPr>
               <a:t> </a:t>
             </a:r>
             <a:r>
-              <a:rPr lang="en-US" baseline="0" dirty="0" smtClean="0"/>
-              <a:t>to our point estimate?  Drum roll.  Enter the </a:t>
-            </a:r>
-            <a:r>
-              <a:rPr lang="en-US" b="1" u="sng" baseline="0" dirty="0" smtClean="0"/>
-              <a:t>Confidence Interval</a:t>
-            </a:r>
-            <a:r>
-              <a:rPr lang="en-US" baseline="0" dirty="0" smtClean="0"/>
-              <a:t>.</a:t>
-            </a:r>
-          </a:p>
-          <a:p>
-            <a:endParaRPr lang="en-US" baseline="0" dirty="0" smtClean="0"/>
+              <a:rPr lang="en-US" dirty="0" smtClean="0"/>
+              <a:t>the </a:t>
+            </a:r>
+            <a:r>
+              <a:rPr lang="en-US" dirty="0"/>
+              <a:t>average of the scores and is calculated by summing the scores and then dividing by </a:t>
+            </a:r>
+            <a:r>
+              <a:rPr lang="en-US" i="1" dirty="0"/>
+              <a:t>N</a:t>
+            </a:r>
+            <a:r>
+              <a:rPr lang="en-US" dirty="0"/>
+              <a:t>. The mathematical notation looks like this: $M = \</a:t>
+            </a:r>
+            <a:r>
+              <a:rPr lang="en-US" dirty="0" err="1"/>
+              <a:t>frac</a:t>
+            </a:r>
+            <a:r>
+              <a:rPr lang="en-US" dirty="0"/>
+              <a:t>{\sum X}{N}$ </a:t>
+            </a:r>
+          </a:p>
+          <a:p>
+            <a:endParaRPr lang="en-US" dirty="0"/>
+          </a:p>
+          <a:p>
+            <a:r>
+              <a:rPr lang="en-US" dirty="0"/>
+              <a:t>With baseline scores obtained, we can now begin the study, being diligent to monitor participant adherence to the protocol. That is, we want to ensure that participants in the treatment group only use </a:t>
+            </a:r>
+            <a:r>
+              <a:rPr lang="en-US" dirty="0" err="1"/>
+              <a:t>Sn$F</a:t>
+            </a:r>
+            <a:r>
+              <a:rPr lang="en-US" dirty="0"/>
+              <a:t>_{2}$ infused toothpaste while those in the control group brush with a product that does not contain this chemical</a:t>
+            </a:r>
+            <a:r>
+              <a:rPr lang="en-US" dirty="0" smtClean="0"/>
+              <a:t>.  </a:t>
+            </a:r>
+            <a:endParaRPr lang="en-US" dirty="0"/>
+          </a:p>
+          <a:p>
+            <a:r>
+              <a:rPr lang="en-US" dirty="0" smtClean="0"/>
+              <a:t/>
+            </a:r>
+            <a:br>
+              <a:rPr lang="en-US" dirty="0" smtClean="0"/>
+            </a:br>
+            <a:endParaRPr lang="en-US" dirty="0"/>
           </a:p>
         </p:txBody>
       </p:sp>
@@ -706,7 +763,7 @@
     </p:spTree>
     <p:extLst>
       <p:ext uri="{BB962C8B-B14F-4D97-AF65-F5344CB8AC3E}">
-        <p14:creationId xmlns:p14="http://schemas.microsoft.com/office/powerpoint/2010/main" val="675232824"/>
+        <p14:creationId xmlns:p14="http://schemas.microsoft.com/office/powerpoint/2010/main" val="3803509901"/>
       </p:ext>
     </p:extLst>
   </p:cSld>
@@ -760,148 +817,53 @@
           <a:bodyPr/>
           <a:lstStyle/>
           <a:p>
-            <a:pPr marL="0" marR="0" lvl="0" indent="0" algn="l" defTabSz="914400" rtl="0" eaLnBrk="1" fontAlgn="auto" latinLnBrk="0" hangingPunct="1">
-              <a:lnSpc>
-                <a:spcPct val="100000"/>
-              </a:lnSpc>
-              <a:spcBef>
-                <a:spcPts val="0"/>
-              </a:spcBef>
-              <a:spcAft>
-                <a:spcPts val="0"/>
-              </a:spcAft>
-              <a:buClrTx/>
-              <a:buSzTx/>
-              <a:buFontTx/>
-              <a:buNone/>
-              <a:tabLst/>
-              <a:defRPr/>
-            </a:pPr>
+            <a:r>
+              <a:rPr lang="en-US" dirty="0"/>
+              <a:t>A cursory glance at these numbers indicates that participants in our treatment group have lower mean values. Our research hypothesis appears to be true -- regular usage of </a:t>
+            </a:r>
+            <a:r>
+              <a:rPr lang="en-US" i="1" dirty="0"/>
+              <a:t>Gum Detoxify</a:t>
+            </a:r>
+            <a:r>
+              <a:rPr lang="en-US" dirty="0"/>
+              <a:t> reduces gum inflammation and bleeding. But can we be sure? How do we definitively rule out the null hypothesis, the idea that our treatment numbers are the product of pure chance (sampling error)? If we ran the experiment again and observed little, if any, difference between our control and treatment groups, that would tend to support the null hypothesis</a:t>
+            </a:r>
+            <a:r>
+              <a:rPr lang="en-US" dirty="0" smtClean="0"/>
+              <a:t>.</a:t>
+            </a:r>
             <a:r>
               <a:rPr lang="en-US" baseline="0" dirty="0" smtClean="0"/>
-              <a:t>As we just saw in the ESCI simulation, our sample means jump from side to side.  Those outside the margins of error could actually be considered misleading.  Imagine if we conducted a single study and obtained an extreme value like one of those pictured in this simulation.  Would you feel comfortable making a clinical recommendation based on that alone?  Thus replication and meta-analysis are becoming more and more important in medical research.</a:t>
-            </a:r>
-          </a:p>
-          <a:p>
-            <a:pPr marL="0" marR="0" lvl="0" indent="0" algn="l" defTabSz="914400" rtl="0" eaLnBrk="1" fontAlgn="auto" latinLnBrk="0" hangingPunct="1">
-              <a:lnSpc>
-                <a:spcPct val="100000"/>
-              </a:lnSpc>
-              <a:spcBef>
-                <a:spcPts val="0"/>
-              </a:spcBef>
-              <a:spcAft>
-                <a:spcPts val="0"/>
-              </a:spcAft>
-              <a:buClrTx/>
-              <a:buSzTx/>
-              <a:buFontTx/>
-              <a:buNone/>
-              <a:tabLst/>
-              <a:defRPr/>
-            </a:pPr>
+              <a:t>  To bolster our argument that SnF infused toothpaste is effective, we could run additional studies or find others which compare it to regular toothpaste.  Then, we could conduct a </a:t>
+            </a:r>
+            <a:r>
+              <a:rPr lang="en-US" b="1" baseline="0" dirty="0" smtClean="0"/>
+              <a:t>meta-analysis</a:t>
+            </a:r>
+            <a:r>
+              <a:rPr lang="en-US" baseline="0" dirty="0" smtClean="0"/>
+              <a:t> to arrive at an overall conclusion.  </a:t>
+            </a:r>
             <a:endParaRPr lang="en-US" baseline="0" dirty="0" smtClean="0"/>
           </a:p>
           <a:p>
-            <a:pPr marL="0" marR="0" lvl="0" indent="0" algn="l" defTabSz="914400" rtl="0" eaLnBrk="1" fontAlgn="auto" latinLnBrk="0" hangingPunct="1">
-              <a:lnSpc>
-                <a:spcPct val="100000"/>
-              </a:lnSpc>
-              <a:spcBef>
-                <a:spcPts val="0"/>
-              </a:spcBef>
-              <a:spcAft>
-                <a:spcPts val="0"/>
-              </a:spcAft>
-              <a:buClrTx/>
-              <a:buSzTx/>
-              <a:buFontTx/>
-              <a:buNone/>
-              <a:tabLst/>
-              <a:defRPr/>
-            </a:pPr>
-            <a:r>
-              <a:rPr lang="en-US" baseline="0" dirty="0" smtClean="0"/>
-              <a:t>Now that we’ve defined what a </a:t>
+            <a:endParaRPr lang="en-US" baseline="0" dirty="0" smtClean="0"/>
+          </a:p>
+          <a:p>
+            <a:r>
+              <a:rPr lang="en-US" b="0" baseline="0" dirty="0" smtClean="0"/>
+              <a:t>So – </a:t>
             </a:r>
             <a:r>
               <a:rPr lang="en-US" b="1" baseline="0" dirty="0" smtClean="0"/>
-              <a:t>confidence interval </a:t>
-            </a:r>
-            <a:r>
-              <a:rPr lang="en-US" baseline="0" dirty="0" smtClean="0"/>
-              <a:t>is, let’s visualize it in ESCI.  </a:t>
-            </a:r>
-          </a:p>
-          <a:p>
-            <a:pPr marL="0" marR="0" lvl="0" indent="0" algn="l" defTabSz="914400" rtl="0" eaLnBrk="1" fontAlgn="auto" latinLnBrk="0" hangingPunct="1">
-              <a:lnSpc>
-                <a:spcPct val="100000"/>
-              </a:lnSpc>
-              <a:spcBef>
-                <a:spcPts val="0"/>
-              </a:spcBef>
-              <a:spcAft>
-                <a:spcPts val="0"/>
-              </a:spcAft>
-              <a:buClrTx/>
-              <a:buSzTx/>
-              <a:buFontTx/>
-              <a:buNone/>
-              <a:tabLst/>
-              <a:defRPr/>
-            </a:pPr>
-            <a:endParaRPr lang="en-US" baseline="0" dirty="0" smtClean="0"/>
-          </a:p>
-          <a:p>
-            <a:pPr marL="0" marR="0" lvl="0" indent="0" algn="l" defTabSz="914400" rtl="0" eaLnBrk="1" fontAlgn="auto" latinLnBrk="0" hangingPunct="1">
-              <a:lnSpc>
-                <a:spcPct val="100000"/>
-              </a:lnSpc>
-              <a:spcBef>
-                <a:spcPts val="0"/>
-              </a:spcBef>
-              <a:spcAft>
-                <a:spcPts val="0"/>
-              </a:spcAft>
-              <a:buClrTx/>
-              <a:buSzTx/>
-              <a:buFontTx/>
-              <a:buNone/>
-              <a:tabLst/>
-              <a:defRPr/>
-            </a:pPr>
-            <a:r>
-              <a:rPr lang="en-US" baseline="0" dirty="0" smtClean="0"/>
-              <a:t>Near red 6, make sure C = 95 and that </a:t>
-            </a:r>
-            <a:r>
-              <a:rPr lang="en-US" b="1" baseline="0" dirty="0" smtClean="0"/>
-              <a:t>Assume s is: Known </a:t>
-            </a:r>
-            <a:r>
-              <a:rPr lang="en-US" baseline="0" dirty="0" smtClean="0"/>
-              <a:t>is selected.  Click CIs.  Near red 7, click </a:t>
-            </a:r>
-            <a:r>
-              <a:rPr lang="en-US" b="1" baseline="0" dirty="0" smtClean="0"/>
-              <a:t>m line </a:t>
-            </a:r>
-            <a:r>
-              <a:rPr lang="en-US" baseline="0" dirty="0" smtClean="0"/>
-              <a:t>and </a:t>
-            </a:r>
-            <a:r>
-              <a:rPr lang="en-US" b="1" baseline="0" dirty="0" smtClean="0"/>
-              <a:t>Capture of m</a:t>
-            </a:r>
-            <a:r>
-              <a:rPr lang="en-US" baseline="0" dirty="0" smtClean="0"/>
-              <a:t>.</a:t>
-            </a:r>
-          </a:p>
-          <a:p>
-            <a:endParaRPr lang="en-US" dirty="0"/>
+              <a:t>case closed</a:t>
+            </a:r>
+            <a:r>
+              <a:rPr lang="en-US" b="0" baseline="0" dirty="0" smtClean="0"/>
+              <a:t>?  Are you ready to recommend that your patient immediately begin using Crest Detoxify?</a:t>
+            </a:r>
+            <a:endParaRPr lang="en-US" b="0" baseline="0" dirty="0" smtClean="0"/>
           </a:p>
         </p:txBody>
       </p:sp>
@@ -931,7 +893,7 @@
     </p:spTree>
     <p:extLst>
       <p:ext uri="{BB962C8B-B14F-4D97-AF65-F5344CB8AC3E}">
-        <p14:creationId xmlns:p14="http://schemas.microsoft.com/office/powerpoint/2010/main" val="709892585"/>
+        <p14:creationId xmlns:p14="http://schemas.microsoft.com/office/powerpoint/2010/main" val="517066876"/>
       </p:ext>
     </p:extLst>
   </p:cSld>
@@ -987,121 +949,110 @@
           <a:p>
             <a:r>
               <a:rPr lang="en-US" dirty="0" smtClean="0"/>
-              <a:t>Armed</a:t>
-            </a:r>
-            <a:r>
-              <a:rPr lang="en-US" baseline="0" dirty="0" smtClean="0"/>
-              <a:t> with a basic understanding of variance and confidence intervals,</a:t>
-            </a:r>
-            <a:r>
-              <a:rPr lang="en-US" dirty="0" smtClean="0"/>
-              <a:t> let’s take a look at some data from an actual study.  These</a:t>
-            </a:r>
-            <a:r>
-              <a:rPr lang="en-US" baseline="0" dirty="0" smtClean="0"/>
-              <a:t> tables are from an article by </a:t>
-            </a:r>
-            <a:r>
-              <a:rPr lang="en-US" baseline="0" dirty="0" err="1" smtClean="0"/>
-              <a:t>Mallett</a:t>
-            </a:r>
-            <a:r>
-              <a:rPr lang="en-US" baseline="0" dirty="0" smtClean="0"/>
-              <a:t>, et al., published in 2007 in the </a:t>
-            </a:r>
-            <a:r>
-              <a:rPr lang="en-US" i="1" dirty="0" smtClean="0"/>
-              <a:t>Journal of Clinical Periodontology.</a:t>
-            </a:r>
-            <a:r>
-              <a:rPr lang="en-US" i="1" baseline="0" dirty="0" smtClean="0"/>
-              <a:t>  </a:t>
-            </a:r>
-            <a:r>
-              <a:rPr lang="en-US" i="0" baseline="0" dirty="0" smtClean="0"/>
-              <a:t>A complete reference is provided at the end of this presentation.</a:t>
-            </a:r>
-            <a:endParaRPr lang="en-US" dirty="0" smtClean="0"/>
-          </a:p>
-          <a:p>
-            <a:endParaRPr lang="en-US" dirty="0" smtClean="0"/>
-          </a:p>
-          <a:p>
-            <a:r>
-              <a:rPr lang="en-US" dirty="0" smtClean="0"/>
-              <a:t>Let's </a:t>
-            </a:r>
-            <a:r>
-              <a:rPr lang="en-US" dirty="0"/>
-              <a:t>briefly review some basic statistics vocabulary. </a:t>
-            </a:r>
-            <a:r>
-              <a:rPr lang="en-US" i="1" dirty="0"/>
-              <a:t>N</a:t>
-            </a:r>
-            <a:r>
-              <a:rPr lang="en-US" dirty="0"/>
-              <a:t> is the number of observations. From the two tables, we see that the sample size for the two groups differs by 2. SD stands for Standard Deviation, a measure of the spread of the data about the mean. In a normal distribution, 68% of the scores are within 1 SD of the mean, 95% within 2 SDs, and 99% within 3 SDs. Unfortunately, we don't have time in this session to delve into the details. And finally, </a:t>
-            </a:r>
-            <a:r>
-              <a:rPr lang="en-US" dirty="0" smtClean="0"/>
-              <a:t>the mean is</a:t>
+              <a:t>Well,</a:t>
             </a:r>
             <a:r>
               <a:rPr lang="en-US" baseline="0" dirty="0" smtClean="0"/>
               <a:t> </a:t>
             </a:r>
             <a:r>
-              <a:rPr lang="en-US" dirty="0" smtClean="0"/>
-              <a:t>the </a:t>
-            </a:r>
-            <a:r>
-              <a:rPr lang="en-US" dirty="0"/>
-              <a:t>average of the scores and is calculated by summing the scores and then dividing by </a:t>
-            </a:r>
-            <a:r>
-              <a:rPr lang="en-US" i="1" dirty="0"/>
-              <a:t>N</a:t>
-            </a:r>
-            <a:r>
-              <a:rPr lang="en-US" dirty="0"/>
-              <a:t>. The mathematical notation looks like this: $M = \</a:t>
-            </a:r>
-            <a:r>
-              <a:rPr lang="en-US" dirty="0" err="1"/>
-              <a:t>frac</a:t>
-            </a:r>
-            <a:r>
-              <a:rPr lang="en-US" dirty="0"/>
-              <a:t>{\sum X}{N}$ </a:t>
-            </a:r>
-          </a:p>
-          <a:p>
-            <a:endParaRPr lang="en-US" dirty="0"/>
-          </a:p>
-          <a:p>
-            <a:r>
-              <a:rPr lang="en-US" dirty="0"/>
-              <a:t>With baseline scores obtained, we can now begin the study, being diligent to monitor participant adherence to the protocol. That is, we want to ensure that participants in the treatment group only use </a:t>
-            </a:r>
-            <a:r>
-              <a:rPr lang="en-US" dirty="0" err="1"/>
-              <a:t>Sn$F</a:t>
-            </a:r>
-            <a:r>
-              <a:rPr lang="en-US" dirty="0"/>
-              <a:t>_{2}$ infused toothpaste while those in the control group brush with a product that does not contain this chemical.</a:t>
-            </a:r>
-          </a:p>
-          <a:p>
-            <a:r>
-              <a:rPr lang="en-US" dirty="0" smtClean="0"/>
-              <a:t/>
-            </a:r>
-            <a:br>
-              <a:rPr lang="en-US" dirty="0" smtClean="0"/>
-            </a:br>
-            <a:endParaRPr lang="en-US" dirty="0"/>
+              <a:rPr lang="en-US" b="1" baseline="0" dirty="0" smtClean="0"/>
+              <a:t>not so fast</a:t>
+            </a:r>
+            <a:r>
+              <a:rPr lang="en-US" baseline="0" dirty="0" smtClean="0"/>
+              <a:t>…  there’s </a:t>
+            </a:r>
+            <a:r>
+              <a:rPr lang="en-US" baseline="0" dirty="0" smtClean="0"/>
+              <a:t>a big gotcha here.  </a:t>
+            </a:r>
+            <a:r>
+              <a:rPr lang="en-US" baseline="0" dirty="0" smtClean="0"/>
+              <a:t>Say “Hello” to the Chance &amp; Variance Monster.  Here’s </a:t>
+            </a:r>
+            <a:r>
+              <a:rPr lang="en-US" baseline="0" dirty="0" smtClean="0"/>
+              <a:t>the problem. </a:t>
+            </a:r>
+            <a:r>
+              <a:rPr lang="en-US" baseline="0" dirty="0" smtClean="0"/>
+              <a:t> Earlier, we divided our sample into control and treatment groups.  Each group then became a sub-sample, representing either the population of those who use Crest Detoxify or the population of those who don’t.  But because of chance, samples vary – sometimes greatly – and provide imprecise estimates of the true population mean.  In other words, chance creates noise, making us less certain of the conclusions we tentatively reached in the last slide.</a:t>
+            </a:r>
+          </a:p>
+          <a:p>
+            <a:endParaRPr lang="en-US" baseline="0" dirty="0" smtClean="0"/>
+          </a:p>
+          <a:p>
+            <a:r>
+              <a:rPr lang="en-US" baseline="0" dirty="0" smtClean="0"/>
+              <a:t>Let’s </a:t>
+            </a:r>
+            <a:r>
+              <a:rPr lang="en-US" baseline="0" dirty="0" smtClean="0"/>
+              <a:t>visualize the problem.  To do so, I’m going to conduct a simulation using a special Excel spreadsheet developed by Geoff Cummings, the author of </a:t>
+            </a:r>
+            <a:r>
+              <a:rPr lang="en-US" u="sng" baseline="0" dirty="0" smtClean="0"/>
+              <a:t>Introduction to the New Statistics</a:t>
+            </a:r>
+            <a:r>
+              <a:rPr lang="en-US" baseline="0" dirty="0" smtClean="0"/>
+              <a:t>.</a:t>
+            </a:r>
+          </a:p>
+          <a:p>
+            <a:endParaRPr lang="en-US" baseline="0" dirty="0" smtClean="0"/>
+          </a:p>
+          <a:p>
+            <a:r>
+              <a:rPr lang="en-US" baseline="0" dirty="0" smtClean="0"/>
+              <a:t>Run simulation with the ESCI </a:t>
+            </a:r>
+            <a:r>
+              <a:rPr lang="en-US" baseline="0" dirty="0" err="1" smtClean="0"/>
+              <a:t>Cijumping</a:t>
+            </a:r>
+            <a:r>
+              <a:rPr lang="en-US" baseline="0" dirty="0" smtClean="0"/>
+              <a:t> tab.  Click on Mean Heap at Red 5.  Turn off Confidence Intervals at Red 6.</a:t>
+            </a:r>
+          </a:p>
+          <a:p>
+            <a:endParaRPr lang="en-US" baseline="0" dirty="0" smtClean="0"/>
+          </a:p>
+          <a:p>
+            <a:r>
+              <a:rPr lang="en-US" baseline="0" dirty="0" smtClean="0"/>
+              <a:t>This is very interesting.  The sample means fall mainly within the two lines which delimit our margin of error.  However, there’s a lot of variability here.  A few sample means fall outside our two lines and are thus poor estimates of the population mean (parameter).  On the other hand, other samples fall close to the true mean.  So how do we communicate this sample variation?  How do we add a certain level of </a:t>
+            </a:r>
+            <a:r>
+              <a:rPr lang="en-US" b="1" u="sng" baseline="0" dirty="0" smtClean="0">
+                <a:effectLst/>
+              </a:rPr>
+              <a:t>fuzziness</a:t>
+            </a:r>
+            <a:r>
+              <a:rPr lang="en-US" baseline="0" dirty="0" smtClean="0">
+                <a:effectLst/>
+              </a:rPr>
+              <a:t> </a:t>
+            </a:r>
+            <a:r>
+              <a:rPr lang="en-US" baseline="0" dirty="0" smtClean="0"/>
+              <a:t>to our point estimate?  Drum roll.  Enter the </a:t>
+            </a:r>
+            <a:r>
+              <a:rPr lang="en-US" b="1" u="sng" baseline="0" dirty="0" smtClean="0"/>
+              <a:t>Confidence Interval</a:t>
+            </a:r>
+            <a:r>
+              <a:rPr lang="en-US" baseline="0" dirty="0" smtClean="0"/>
+              <a:t>.</a:t>
+            </a:r>
+          </a:p>
+          <a:p>
+            <a:endParaRPr lang="en-US" baseline="0" dirty="0" smtClean="0"/>
           </a:p>
         </p:txBody>
       </p:sp>
@@ -1131,7 +1082,7 @@
     </p:spTree>
     <p:extLst>
       <p:ext uri="{BB962C8B-B14F-4D97-AF65-F5344CB8AC3E}">
-        <p14:creationId xmlns:p14="http://schemas.microsoft.com/office/powerpoint/2010/main" val="3803509901"/>
+        <p14:creationId xmlns:p14="http://schemas.microsoft.com/office/powerpoint/2010/main" val="675232824"/>
       </p:ext>
     </p:extLst>
   </p:cSld>
@@ -1185,34 +1136,148 @@
           <a:bodyPr/>
           <a:lstStyle/>
           <a:p>
-            <a:r>
-              <a:rPr lang="en-US" dirty="0"/>
-              <a:t>A cursory glance at these numbers indicates that participants in our treatment group have lower mean values. Our research hypothesis appears to be true -- regular usage of </a:t>
-            </a:r>
-            <a:r>
-              <a:rPr lang="en-US" i="1" dirty="0"/>
-              <a:t>Gum Detoxify</a:t>
-            </a:r>
-            <a:r>
-              <a:rPr lang="en-US" dirty="0"/>
-              <a:t> reduces gum inflammation and bleeding. But can we be sure? How do we definitively rule out the null hypothesis, the idea that our treatment numbers are the product of pure chance (sampling error)? If we ran the experiment again and observed little, if any, difference between our control and treatment groups, that would tend to support the null hypothesis</a:t>
-            </a:r>
-            <a:r>
-              <a:rPr lang="en-US" dirty="0" smtClean="0"/>
+            <a:pPr marL="0" marR="0" lvl="0" indent="0" algn="l" defTabSz="914400" rtl="0" eaLnBrk="1" fontAlgn="auto" latinLnBrk="0" hangingPunct="1">
+              <a:lnSpc>
+                <a:spcPct val="100000"/>
+              </a:lnSpc>
+              <a:spcBef>
+                <a:spcPts val="0"/>
+              </a:spcBef>
+              <a:spcAft>
+                <a:spcPts val="0"/>
+              </a:spcAft>
+              <a:buClrTx/>
+              <a:buSzTx/>
+              <a:buFontTx/>
+              <a:buNone/>
+              <a:tabLst/>
+              <a:defRPr/>
+            </a:pPr>
+            <a:r>
+              <a:rPr lang="en-US" baseline="0" dirty="0" smtClean="0"/>
+              <a:t>As we just saw in the ESCI simulation, our sample means jump from side to side.  Those outside the margins of error could actually be considered misleading.  Imagine if we conducted a single study and obtained an extreme value like one of those pictured in this simulation.  Would you feel comfortable making a clinical recommendation based on that alone?  Thus replication and meta-analysis are becoming more and more important in medical research.</a:t>
+            </a:r>
+          </a:p>
+          <a:p>
+            <a:pPr marL="0" marR="0" lvl="0" indent="0" algn="l" defTabSz="914400" rtl="0" eaLnBrk="1" fontAlgn="auto" latinLnBrk="0" hangingPunct="1">
+              <a:lnSpc>
+                <a:spcPct val="100000"/>
+              </a:lnSpc>
+              <a:spcBef>
+                <a:spcPts val="0"/>
+              </a:spcBef>
+              <a:spcAft>
+                <a:spcPts val="0"/>
+              </a:spcAft>
+              <a:buClrTx/>
+              <a:buSzTx/>
+              <a:buFontTx/>
+              <a:buNone/>
+              <a:tabLst/>
+              <a:defRPr/>
+            </a:pPr>
+            <a:endParaRPr lang="en-US" baseline="0" dirty="0" smtClean="0"/>
+          </a:p>
+          <a:p>
+            <a:pPr marL="0" marR="0" lvl="0" indent="0" algn="l" defTabSz="914400" rtl="0" eaLnBrk="1" fontAlgn="auto" latinLnBrk="0" hangingPunct="1">
+              <a:lnSpc>
+                <a:spcPct val="100000"/>
+              </a:lnSpc>
+              <a:spcBef>
+                <a:spcPts val="0"/>
+              </a:spcBef>
+              <a:spcAft>
+                <a:spcPts val="0"/>
+              </a:spcAft>
+              <a:buClrTx/>
+              <a:buSzTx/>
+              <a:buFontTx/>
+              <a:buNone/>
+              <a:tabLst/>
+              <a:defRPr/>
+            </a:pPr>
+            <a:r>
+              <a:rPr lang="en-US" baseline="0" dirty="0" smtClean="0"/>
+              <a:t>Now that we’ve defined what a </a:t>
+            </a:r>
+            <a:r>
+              <a:rPr lang="en-US" b="1" baseline="0" dirty="0" smtClean="0"/>
+              <a:t>confidence interval </a:t>
+            </a:r>
+            <a:r>
+              <a:rPr lang="en-US" baseline="0" dirty="0" smtClean="0"/>
+              <a:t>is, let’s visualize it in ESCI.  </a:t>
+            </a:r>
+          </a:p>
+          <a:p>
+            <a:pPr marL="0" marR="0" lvl="0" indent="0" algn="l" defTabSz="914400" rtl="0" eaLnBrk="1" fontAlgn="auto" latinLnBrk="0" hangingPunct="1">
+              <a:lnSpc>
+                <a:spcPct val="100000"/>
+              </a:lnSpc>
+              <a:spcBef>
+                <a:spcPts val="0"/>
+              </a:spcBef>
+              <a:spcAft>
+                <a:spcPts val="0"/>
+              </a:spcAft>
+              <a:buClrTx/>
+              <a:buSzTx/>
+              <a:buFontTx/>
+              <a:buNone/>
+              <a:tabLst/>
+              <a:defRPr/>
+            </a:pPr>
+            <a:endParaRPr lang="en-US" baseline="0" dirty="0" smtClean="0"/>
+          </a:p>
+          <a:p>
+            <a:pPr marL="0" marR="0" lvl="0" indent="0" algn="l" defTabSz="914400" rtl="0" eaLnBrk="1" fontAlgn="auto" latinLnBrk="0" hangingPunct="1">
+              <a:lnSpc>
+                <a:spcPct val="100000"/>
+              </a:lnSpc>
+              <a:spcBef>
+                <a:spcPts val="0"/>
+              </a:spcBef>
+              <a:spcAft>
+                <a:spcPts val="0"/>
+              </a:spcAft>
+              <a:buClrTx/>
+              <a:buSzTx/>
+              <a:buFontTx/>
+              <a:buNone/>
+              <a:tabLst/>
+              <a:defRPr/>
+            </a:pPr>
+            <a:r>
+              <a:rPr lang="en-US" baseline="0" dirty="0" smtClean="0"/>
+              <a:t>Near red 6, make sure C = 95 and that </a:t>
+            </a:r>
+            <a:r>
+              <a:rPr lang="en-US" b="1" baseline="0" dirty="0" smtClean="0"/>
+              <a:t>Assume s is: Known </a:t>
+            </a:r>
+            <a:r>
+              <a:rPr lang="en-US" baseline="0" dirty="0" smtClean="0"/>
+              <a:t>is selected.  Click CIs.  Near red 7, click </a:t>
+            </a:r>
+            <a:r>
+              <a:rPr lang="en-US" b="1" baseline="0" dirty="0" smtClean="0"/>
+              <a:t>m line </a:t>
+            </a:r>
+            <a:r>
+              <a:rPr lang="en-US" baseline="0" dirty="0" smtClean="0"/>
+              <a:t>and </a:t>
+            </a:r>
+            <a:r>
+              <a:rPr lang="en-US" b="1" baseline="0" dirty="0" smtClean="0"/>
+              <a:t>Capture of m</a:t>
+            </a:r>
+            <a:r>
+              <a:rPr lang="en-US" baseline="0" dirty="0" smtClean="0"/>
               <a:t>.</a:t>
             </a:r>
-            <a:r>
-              <a:rPr lang="en-US" baseline="0" dirty="0" smtClean="0"/>
-              <a:t>  To bolster our argument that SnF infused toothpaste is effective, we could run additional studies or find others which compare it to regular toothpaste.  Then, we could conduct a </a:t>
-            </a:r>
-            <a:r>
-              <a:rPr lang="en-US" b="1" baseline="0" dirty="0" smtClean="0"/>
-              <a:t>meta-analysis</a:t>
-            </a:r>
-            <a:r>
-              <a:rPr lang="en-US" baseline="0" dirty="0" smtClean="0"/>
-              <a:t> to arrive at an overall conclusion.  As this topic is beyond the scope of today’s presentation, let’s continue…</a:t>
-            </a:r>
+          </a:p>
+          <a:p>
+            <a:endParaRPr lang="en-US" dirty="0"/>
           </a:p>
         </p:txBody>
       </p:sp>
@@ -1242,7 +1307,7 @@
     </p:spTree>
     <p:extLst>
       <p:ext uri="{BB962C8B-B14F-4D97-AF65-F5344CB8AC3E}">
-        <p14:creationId xmlns:p14="http://schemas.microsoft.com/office/powerpoint/2010/main" val="517066876"/>
+        <p14:creationId xmlns:p14="http://schemas.microsoft.com/office/powerpoint/2010/main" val="709892585"/>
       </p:ext>
     </p:extLst>
   </p:cSld>
@@ -1314,48 +1379,136 @@
               <a:defRPr/>
             </a:pPr>
             <a:r>
+              <a:rPr lang="en-US" baseline="0" dirty="0" smtClean="0"/>
+              <a:t>Can the </a:t>
+            </a:r>
+            <a:r>
+              <a:rPr lang="en-US" b="1" baseline="0" dirty="0" smtClean="0"/>
+              <a:t>Chance Monster </a:t>
+            </a:r>
+            <a:r>
+              <a:rPr lang="en-US" b="0" baseline="0" dirty="0" smtClean="0"/>
+              <a:t>be defeated</a:t>
+            </a:r>
+            <a:r>
+              <a:rPr lang="en-US" baseline="0" dirty="0" smtClean="0"/>
+              <a:t>?</a:t>
+            </a:r>
+            <a:endParaRPr lang="en-US" dirty="0" smtClean="0"/>
+          </a:p>
+          <a:p>
+            <a:pPr marL="0" marR="0" lvl="0" indent="0" algn="l" defTabSz="914400" rtl="0" eaLnBrk="1" fontAlgn="auto" latinLnBrk="0" hangingPunct="1">
+              <a:lnSpc>
+                <a:spcPct val="100000"/>
+              </a:lnSpc>
+              <a:spcBef>
+                <a:spcPts val="0"/>
+              </a:spcBef>
+              <a:spcAft>
+                <a:spcPts val="0"/>
+              </a:spcAft>
+              <a:buClrTx/>
+              <a:buSzTx/>
+              <a:buFontTx/>
+              <a:buNone/>
+              <a:tabLst/>
+              <a:defRPr/>
+            </a:pPr>
+            <a:endParaRPr lang="en-US" dirty="0" smtClean="0"/>
+          </a:p>
+          <a:p>
+            <a:pPr marL="0" marR="0" lvl="0" indent="0" algn="l" defTabSz="914400" rtl="0" eaLnBrk="1" fontAlgn="auto" latinLnBrk="0" hangingPunct="1">
+              <a:lnSpc>
+                <a:spcPct val="100000"/>
+              </a:lnSpc>
+              <a:spcBef>
+                <a:spcPts val="0"/>
+              </a:spcBef>
+              <a:spcAft>
+                <a:spcPts val="0"/>
+              </a:spcAft>
+              <a:buClrTx/>
+              <a:buSzTx/>
+              <a:buFontTx/>
+              <a:buNone/>
+              <a:tabLst/>
+              <a:defRPr/>
+            </a:pPr>
+            <a:r>
               <a:rPr lang="en-US" dirty="0" smtClean="0"/>
-              <a:t>Now that we’ve looked at</a:t>
+              <a:t>Clearly, what we </a:t>
+            </a:r>
+            <a:r>
+              <a:rPr lang="en-US" dirty="0" smtClean="0"/>
+              <a:t>need </a:t>
+            </a:r>
+            <a:r>
+              <a:rPr lang="en-US" dirty="0" smtClean="0"/>
+              <a:t>is a </a:t>
+            </a:r>
+            <a:r>
+              <a:rPr lang="en-US" dirty="0" smtClean="0"/>
+              <a:t>way to determine if the observed distance between the control and treatment means is large enough </a:t>
+            </a:r>
+            <a:r>
+              <a:rPr lang="en-US" dirty="0" smtClean="0"/>
+              <a:t>to </a:t>
             </a:r>
             <a:r>
               <a:rPr lang="en-US" baseline="0" dirty="0" smtClean="0"/>
-              <a:t> the data in the previous two slides, </a:t>
+              <a:t>silence the Chance Monster once and for all.  Or, as statisticians would say, “Are the results </a:t>
+            </a:r>
+            <a:r>
+              <a:rPr lang="en-US" i="1" baseline="0" dirty="0" smtClean="0"/>
+              <a:t>significant?</a:t>
+            </a:r>
+            <a:r>
+              <a:rPr lang="en-US" i="0" baseline="0" dirty="0" smtClean="0"/>
+              <a:t>  </a:t>
             </a:r>
             <a:r>
               <a:rPr lang="en-US" dirty="0" smtClean="0"/>
-              <a:t>we clearly need a way to determine if the observed distance between the control and treatment means is large enough to be considered </a:t>
-            </a:r>
-            <a:r>
-              <a:rPr lang="en-US" i="1" dirty="0" smtClean="0"/>
-              <a:t>significant</a:t>
+              <a:t>That</a:t>
+            </a:r>
+            <a:r>
+              <a:rPr lang="en-US" baseline="0" dirty="0" smtClean="0"/>
+              <a:t> is</a:t>
             </a:r>
             <a:r>
               <a:rPr lang="en-US" dirty="0" smtClean="0"/>
-              <a:t>. Or put another way, is it highly unlikely (improbable) that the observed difference is due to chance? Remember: our goal here is to rule out chance as a possible explanation for the</a:t>
+              <a:t>, </a:t>
+            </a:r>
+            <a:r>
+              <a:rPr lang="en-US" dirty="0" smtClean="0"/>
+              <a:t>is it highly unlikely (improbable) that the observed difference </a:t>
+            </a:r>
+            <a:r>
+              <a:rPr lang="en-US" dirty="0" smtClean="0"/>
+              <a:t>between our </a:t>
+            </a:r>
+            <a:r>
+              <a:rPr lang="en-US" dirty="0" err="1" smtClean="0"/>
+              <a:t>SnF</a:t>
+            </a:r>
+            <a:r>
+              <a:rPr lang="en-US" dirty="0" smtClean="0"/>
+              <a:t> treatment</a:t>
             </a:r>
             <a:r>
               <a:rPr lang="en-US" baseline="0" dirty="0" smtClean="0"/>
-              <a:t> difference between our control and </a:t>
-            </a:r>
-            <a:r>
-              <a:rPr lang="en-US" baseline="0" dirty="0" err="1" smtClean="0"/>
-              <a:t>SnF</a:t>
+              <a:t> and control groups is due to chance?  In </a:t>
             </a:r>
             <a:r>
               <a:rPr lang="en-US" baseline="0" dirty="0" smtClean="0"/>
-              <a:t> group.  In the case of traditional NHST, this is done by calculating a p-value.  However, this leads to binary (yes/no) thinking.  P is significant, typically less than .05, or it isn’t – in which case a research journal will probably </a:t>
-            </a:r>
-            <a:r>
-              <a:rPr lang="en-US" baseline="0" smtClean="0"/>
-              <a:t>not </a:t>
-            </a:r>
-            <a:r>
-              <a:rPr lang="en-US" baseline="0" smtClean="0"/>
-              <a:t>publish </a:t>
+              <a:t>the case of traditional NHST, this is done by calculating a p-value.  However, this leads to binary (yes/no) thinking.  P is significant, typically less than .05, or it isn’t – in which case a research journal will probably not publish the findings. </a:t>
             </a:r>
             <a:r>
               <a:rPr lang="en-US" baseline="0" dirty="0" smtClean="0"/>
-              <a:t>the findings. And besides, as we saw in our first ESCI simulation, a point estimate can vary greatly, thanks to chance.  The problem is that NHST gives us an illusion of certainty whereas the reality is much more nuanced.  </a:t>
+              <a:t>And, </a:t>
+            </a:r>
+            <a:r>
+              <a:rPr lang="en-US" baseline="0" dirty="0" smtClean="0"/>
+              <a:t>as we saw in our first ESCI simulation, a point estimate can vary greatly, thanks to chance.  The problem is that NHST gives us an illusion of certainty whereas the reality is much more nuanced.  </a:t>
             </a:r>
           </a:p>
           <a:p>
@@ -2622,7 +2775,15 @@
           <a:p>
             <a:r>
               <a:rPr lang="en-US" dirty="0"/>
-              <a:t>Our next step is to randomly assign each study participant to either the control or treatment group, a process that can be done easily in </a:t>
+              <a:t>Our next step is to randomly assign each study participant </a:t>
+            </a:r>
+            <a:r>
+              <a:rPr lang="en-US" dirty="0" smtClean="0"/>
+              <a:t>in our sample to </a:t>
+            </a:r>
+            <a:r>
+              <a:rPr lang="en-US" dirty="0"/>
+              <a:t>either the control or treatment group, a process that can be done easily in </a:t>
             </a:r>
             <a:r>
               <a:rPr lang="en-US" dirty="0" smtClean="0"/>
@@ -3428,7 +3589,7 @@
           <a:p>
             <a:fld id="{96DFF08F-DC6B-4601-B491-B0F83F6DD2DA}" type="datetimeFigureOut">
               <a:rPr lang="en-US" smtClean="0"/>
-              <a:t>6/10/2019</a:t>
+              <a:t>6/12/2019</a:t>
             </a:fld>
             <a:endParaRPr lang="en-US" dirty="0"/>
           </a:p>
@@ -3680,7 +3841,7 @@
             <a:fld id="{96DFF08F-DC6B-4601-B491-B0F83F6DD2DA}" type="datetimeFigureOut">
               <a:rPr lang="en-US" smtClean="0"/>
               <a:pPr/>
-              <a:t>6/10/2019</a:t>
+              <a:t>6/12/2019</a:t>
             </a:fld>
             <a:endParaRPr lang="en-US" dirty="0"/>
           </a:p>
@@ -3996,7 +4157,7 @@
             <a:fld id="{96DFF08F-DC6B-4601-B491-B0F83F6DD2DA}" type="datetimeFigureOut">
               <a:rPr lang="en-US" smtClean="0"/>
               <a:pPr/>
-              <a:t>6/10/2019</a:t>
+              <a:t>6/12/2019</a:t>
             </a:fld>
             <a:endParaRPr lang="en-US" dirty="0"/>
           </a:p>
@@ -4331,7 +4492,7 @@
             <a:fld id="{96DFF08F-DC6B-4601-B491-B0F83F6DD2DA}" type="datetimeFigureOut">
               <a:rPr lang="en-US" smtClean="0"/>
               <a:pPr/>
-              <a:t>6/10/2019</a:t>
+              <a:t>6/12/2019</a:t>
             </a:fld>
             <a:endParaRPr lang="en-US" dirty="0"/>
           </a:p>
@@ -4647,7 +4808,7 @@
             <a:fld id="{96DFF08F-DC6B-4601-B491-B0F83F6DD2DA}" type="datetimeFigureOut">
               <a:rPr lang="en-US" smtClean="0"/>
               <a:pPr/>
-              <a:t>6/10/2019</a:t>
+              <a:t>6/12/2019</a:t>
             </a:fld>
             <a:endParaRPr lang="en-US" dirty="0"/>
           </a:p>
@@ -5042,7 +5203,7 @@
             <a:fld id="{96DFF08F-DC6B-4601-B491-B0F83F6DD2DA}" type="datetimeFigureOut">
               <a:rPr lang="en-US" smtClean="0"/>
               <a:pPr/>
-              <a:t>6/10/2019</a:t>
+              <a:t>6/12/2019</a:t>
             </a:fld>
             <a:endParaRPr lang="en-US" dirty="0"/>
           </a:p>
@@ -5213,7 +5374,7 @@
           <a:p>
             <a:fld id="{96DFF08F-DC6B-4601-B491-B0F83F6DD2DA}" type="datetimeFigureOut">
               <a:rPr lang="en-US" smtClean="0"/>
-              <a:t>6/10/2019</a:t>
+              <a:t>6/12/2019</a:t>
             </a:fld>
             <a:endParaRPr lang="en-US" dirty="0"/>
           </a:p>
@@ -5393,7 +5554,7 @@
           <a:p>
             <a:fld id="{96DFF08F-DC6B-4601-B491-B0F83F6DD2DA}" type="datetimeFigureOut">
               <a:rPr lang="en-US" smtClean="0"/>
-              <a:t>6/10/2019</a:t>
+              <a:t>6/12/2019</a:t>
             </a:fld>
             <a:endParaRPr lang="en-US" dirty="0"/>
           </a:p>
@@ -5563,7 +5724,7 @@
           <a:p>
             <a:fld id="{96DFF08F-DC6B-4601-B491-B0F83F6DD2DA}" type="datetimeFigureOut">
               <a:rPr lang="en-US" smtClean="0"/>
-              <a:t>6/10/2019</a:t>
+              <a:t>6/12/2019</a:t>
             </a:fld>
             <a:endParaRPr lang="en-US" dirty="0"/>
           </a:p>
@@ -5810,7 +5971,7 @@
           <a:p>
             <a:fld id="{96DFF08F-DC6B-4601-B491-B0F83F6DD2DA}" type="datetimeFigureOut">
               <a:rPr lang="en-US" smtClean="0"/>
-              <a:t>6/10/2019</a:t>
+              <a:t>6/12/2019</a:t>
             </a:fld>
             <a:endParaRPr lang="en-US" dirty="0"/>
           </a:p>
@@ -6042,7 +6203,7 @@
           <a:p>
             <a:fld id="{96DFF08F-DC6B-4601-B491-B0F83F6DD2DA}" type="datetimeFigureOut">
               <a:rPr lang="en-US" smtClean="0"/>
-              <a:t>6/10/2019</a:t>
+              <a:t>6/12/2019</a:t>
             </a:fld>
             <a:endParaRPr lang="en-US" dirty="0"/>
           </a:p>
@@ -6416,7 +6577,7 @@
           <a:p>
             <a:fld id="{96DFF08F-DC6B-4601-B491-B0F83F6DD2DA}" type="datetimeFigureOut">
               <a:rPr lang="en-US" smtClean="0"/>
-              <a:t>6/10/2019</a:t>
+              <a:t>6/12/2019</a:t>
             </a:fld>
             <a:endParaRPr lang="en-US" dirty="0"/>
           </a:p>
@@ -6539,7 +6700,7 @@
           <a:p>
             <a:fld id="{96DFF08F-DC6B-4601-B491-B0F83F6DD2DA}" type="datetimeFigureOut">
               <a:rPr lang="en-US" smtClean="0"/>
-              <a:t>6/10/2019</a:t>
+              <a:t>6/12/2019</a:t>
             </a:fld>
             <a:endParaRPr lang="en-US" dirty="0"/>
           </a:p>
@@ -6634,7 +6795,7 @@
           <a:p>
             <a:fld id="{96DFF08F-DC6B-4601-B491-B0F83F6DD2DA}" type="datetimeFigureOut">
               <a:rPr lang="en-US" smtClean="0"/>
-              <a:t>6/10/2019</a:t>
+              <a:t>6/12/2019</a:t>
             </a:fld>
             <a:endParaRPr lang="en-US" dirty="0"/>
           </a:p>
@@ -6889,7 +7050,7 @@
           <a:p>
             <a:fld id="{96DFF08F-DC6B-4601-B491-B0F83F6DD2DA}" type="datetimeFigureOut">
               <a:rPr lang="en-US" smtClean="0"/>
-              <a:t>6/10/2019</a:t>
+              <a:t>6/12/2019</a:t>
             </a:fld>
             <a:endParaRPr lang="en-US" dirty="0"/>
           </a:p>
@@ -7194,7 +7355,7 @@
           <a:p>
             <a:fld id="{96DFF08F-DC6B-4601-B491-B0F83F6DD2DA}" type="datetimeFigureOut">
               <a:rPr lang="en-US" smtClean="0"/>
-              <a:t>6/10/2019</a:t>
+              <a:t>6/12/2019</a:t>
             </a:fld>
             <a:endParaRPr lang="en-US" dirty="0"/>
           </a:p>
@@ -7897,7 +8058,7 @@
             <a:fld id="{96DFF08F-DC6B-4601-B491-B0F83F6DD2DA}" type="datetimeFigureOut">
               <a:rPr lang="en-US" smtClean="0"/>
               <a:pPr/>
-              <a:t>6/10/2019</a:t>
+              <a:t>6/12/2019</a:t>
             </a:fld>
             <a:endParaRPr lang="en-US" dirty="0"/>
           </a:p>
@@ -8547,758 +8708,6 @@
           <a:chExt cx="0" cy="0"/>
         </a:xfrm>
       </p:grpSpPr>
-      <p:pic>
-        <p:nvPicPr>
-          <p:cNvPr id="4" name="Picture 3"/>
-          <p:cNvPicPr>
-            <a:picLocks noChangeAspect="1"/>
-          </p:cNvPicPr>
-          <p:nvPr/>
-        </p:nvPicPr>
-        <p:blipFill>
-          <a:blip r:embed="rId3">
-            <a:extLst>
-              <a:ext uri="{28A0092B-C50C-407E-A947-70E740481C1C}">
-                <a14:useLocalDpi xmlns:a14="http://schemas.microsoft.com/office/drawing/2010/main" val="0"/>
-              </a:ext>
-            </a:extLst>
-          </a:blip>
-          <a:stretch>
-            <a:fillRect/>
-          </a:stretch>
-        </p:blipFill>
-        <p:spPr>
-          <a:xfrm>
-            <a:off x="1238110" y="757927"/>
-            <a:ext cx="4375926" cy="3581907"/>
-          </a:xfrm>
-          <a:prstGeom prst="rect">
-            <a:avLst/>
-          </a:prstGeom>
-        </p:spPr>
-      </p:pic>
-      <p:sp>
-        <p:nvSpPr>
-          <p:cNvPr id="5" name="Content Placeholder 2"/>
-          <p:cNvSpPr txBox="1">
-            <a:spLocks/>
-          </p:cNvSpPr>
-          <p:nvPr/>
-        </p:nvSpPr>
-        <p:spPr>
-          <a:xfrm>
-            <a:off x="4796446" y="5262371"/>
-            <a:ext cx="4918190" cy="440159"/>
-          </a:xfrm>
-          <a:prstGeom prst="rect">
-            <a:avLst/>
-          </a:prstGeom>
-        </p:spPr>
-        <p:txBody>
-          <a:bodyPr vert="horz" lIns="91440" tIns="45720" rIns="91440" bIns="45720" rtlCol="0">
-            <a:normAutofit fontScale="85000" lnSpcReduction="10000"/>
-          </a:bodyPr>
-          <a:lstStyle>
-            <a:lvl1pPr marL="342900" indent="-342900" algn="l" defTabSz="457200" rtl="0" eaLnBrk="1" latinLnBrk="0" hangingPunct="1">
-              <a:spcBef>
-                <a:spcPts val="1000"/>
-              </a:spcBef>
-              <a:spcAft>
-                <a:spcPts val="0"/>
-              </a:spcAft>
-              <a:buClr>
-                <a:schemeClr val="accent1"/>
-              </a:buClr>
-              <a:buSzPct val="80000"/>
-              <a:buFont typeface="Wingdings 3" charset="2"/>
-              <a:buChar char=""/>
-              <a:defRPr sz="1800" kern="1200">
-                <a:solidFill>
-                  <a:schemeClr val="tx1">
-                    <a:lumMod val="75000"/>
-                    <a:lumOff val="25000"/>
-                  </a:schemeClr>
-                </a:solidFill>
-                <a:latin typeface="+mn-lt"/>
-                <a:ea typeface="+mn-ea"/>
-                <a:cs typeface="+mn-cs"/>
-              </a:defRPr>
-            </a:lvl1pPr>
-            <a:lvl2pPr marL="742950" indent="-285750" algn="l" defTabSz="457200" rtl="0" eaLnBrk="1" latinLnBrk="0" hangingPunct="1">
-              <a:spcBef>
-                <a:spcPts val="1000"/>
-              </a:spcBef>
-              <a:spcAft>
-                <a:spcPts val="0"/>
-              </a:spcAft>
-              <a:buClr>
-                <a:schemeClr val="accent1"/>
-              </a:buClr>
-              <a:buSzPct val="80000"/>
-              <a:buFont typeface="Wingdings 3" charset="2"/>
-              <a:buChar char=""/>
-              <a:defRPr sz="1600" kern="1200">
-                <a:solidFill>
-                  <a:schemeClr val="tx1">
-                    <a:lumMod val="75000"/>
-                    <a:lumOff val="25000"/>
-                  </a:schemeClr>
-                </a:solidFill>
-                <a:latin typeface="+mn-lt"/>
-                <a:ea typeface="+mn-ea"/>
-                <a:cs typeface="+mn-cs"/>
-              </a:defRPr>
-            </a:lvl2pPr>
-            <a:lvl3pPr marL="1143000" indent="-228600" algn="l" defTabSz="457200" rtl="0" eaLnBrk="1" latinLnBrk="0" hangingPunct="1">
-              <a:spcBef>
-                <a:spcPts val="1000"/>
-              </a:spcBef>
-              <a:spcAft>
-                <a:spcPts val="0"/>
-              </a:spcAft>
-              <a:buClr>
-                <a:schemeClr val="accent1"/>
-              </a:buClr>
-              <a:buSzPct val="80000"/>
-              <a:buFont typeface="Wingdings 3" charset="2"/>
-              <a:buChar char=""/>
-              <a:defRPr sz="1400" kern="1200">
-                <a:solidFill>
-                  <a:schemeClr val="tx1">
-                    <a:lumMod val="75000"/>
-                    <a:lumOff val="25000"/>
-                  </a:schemeClr>
-                </a:solidFill>
-                <a:latin typeface="+mn-lt"/>
-                <a:ea typeface="+mn-ea"/>
-                <a:cs typeface="+mn-cs"/>
-              </a:defRPr>
-            </a:lvl3pPr>
-            <a:lvl4pPr marL="1600200" indent="-228600" algn="l" defTabSz="457200" rtl="0" eaLnBrk="1" latinLnBrk="0" hangingPunct="1">
-              <a:spcBef>
-                <a:spcPts val="1000"/>
-              </a:spcBef>
-              <a:spcAft>
-                <a:spcPts val="0"/>
-              </a:spcAft>
-              <a:buClr>
-                <a:schemeClr val="accent1"/>
-              </a:buClr>
-              <a:buSzPct val="80000"/>
-              <a:buFont typeface="Wingdings 3" charset="2"/>
-              <a:buChar char=""/>
-              <a:defRPr sz="1200" kern="1200">
-                <a:solidFill>
-                  <a:schemeClr val="tx1">
-                    <a:lumMod val="75000"/>
-                    <a:lumOff val="25000"/>
-                  </a:schemeClr>
-                </a:solidFill>
-                <a:latin typeface="+mn-lt"/>
-                <a:ea typeface="+mn-ea"/>
-                <a:cs typeface="+mn-cs"/>
-              </a:defRPr>
-            </a:lvl4pPr>
-            <a:lvl5pPr marL="2057400" indent="-228600" algn="l" defTabSz="457200" rtl="0" eaLnBrk="1" latinLnBrk="0" hangingPunct="1">
-              <a:spcBef>
-                <a:spcPts val="1000"/>
-              </a:spcBef>
-              <a:spcAft>
-                <a:spcPts val="0"/>
-              </a:spcAft>
-              <a:buClr>
-                <a:schemeClr val="accent1"/>
-              </a:buClr>
-              <a:buSzPct val="80000"/>
-              <a:buFont typeface="Wingdings 3" charset="2"/>
-              <a:buChar char=""/>
-              <a:defRPr sz="1200" kern="1200">
-                <a:solidFill>
-                  <a:schemeClr val="tx1">
-                    <a:lumMod val="75000"/>
-                    <a:lumOff val="25000"/>
-                  </a:schemeClr>
-                </a:solidFill>
-                <a:latin typeface="+mn-lt"/>
-                <a:ea typeface="+mn-ea"/>
-                <a:cs typeface="+mn-cs"/>
-              </a:defRPr>
-            </a:lvl5pPr>
-            <a:lvl6pPr marL="2514600" indent="-228600" algn="l" defTabSz="457200" rtl="0" eaLnBrk="1" latinLnBrk="0" hangingPunct="1">
-              <a:spcBef>
-                <a:spcPts val="1000"/>
-              </a:spcBef>
-              <a:spcAft>
-                <a:spcPts val="0"/>
-              </a:spcAft>
-              <a:buClr>
-                <a:schemeClr val="accent1"/>
-              </a:buClr>
-              <a:buSzPct val="80000"/>
-              <a:buFont typeface="Wingdings 3" charset="2"/>
-              <a:buChar char=""/>
-              <a:defRPr sz="1200" kern="1200">
-                <a:solidFill>
-                  <a:schemeClr val="tx1">
-                    <a:lumMod val="75000"/>
-                    <a:lumOff val="25000"/>
-                  </a:schemeClr>
-                </a:solidFill>
-                <a:latin typeface="+mn-lt"/>
-                <a:ea typeface="+mn-ea"/>
-                <a:cs typeface="+mn-cs"/>
-              </a:defRPr>
-            </a:lvl6pPr>
-            <a:lvl7pPr marL="2971800" indent="-228600" algn="l" defTabSz="457200" rtl="0" eaLnBrk="1" latinLnBrk="0" hangingPunct="1">
-              <a:spcBef>
-                <a:spcPts val="1000"/>
-              </a:spcBef>
-              <a:spcAft>
-                <a:spcPts val="0"/>
-              </a:spcAft>
-              <a:buClr>
-                <a:schemeClr val="accent1"/>
-              </a:buClr>
-              <a:buSzPct val="80000"/>
-              <a:buFont typeface="Wingdings 3" charset="2"/>
-              <a:buChar char=""/>
-              <a:defRPr sz="1200" kern="1200">
-                <a:solidFill>
-                  <a:schemeClr val="tx1">
-                    <a:lumMod val="75000"/>
-                    <a:lumOff val="25000"/>
-                  </a:schemeClr>
-                </a:solidFill>
-                <a:latin typeface="+mn-lt"/>
-                <a:ea typeface="+mn-ea"/>
-                <a:cs typeface="+mn-cs"/>
-              </a:defRPr>
-            </a:lvl7pPr>
-            <a:lvl8pPr marL="3429000" indent="-228600" algn="l" defTabSz="457200" rtl="0" eaLnBrk="1" latinLnBrk="0" hangingPunct="1">
-              <a:spcBef>
-                <a:spcPts val="1000"/>
-              </a:spcBef>
-              <a:spcAft>
-                <a:spcPts val="0"/>
-              </a:spcAft>
-              <a:buClr>
-                <a:schemeClr val="accent1"/>
-              </a:buClr>
-              <a:buSzPct val="80000"/>
-              <a:buFont typeface="Wingdings 3" charset="2"/>
-              <a:buChar char=""/>
-              <a:defRPr sz="1200" kern="1200">
-                <a:solidFill>
-                  <a:schemeClr val="tx1">
-                    <a:lumMod val="75000"/>
-                    <a:lumOff val="25000"/>
-                  </a:schemeClr>
-                </a:solidFill>
-                <a:latin typeface="+mn-lt"/>
-                <a:ea typeface="+mn-ea"/>
-                <a:cs typeface="+mn-cs"/>
-              </a:defRPr>
-            </a:lvl8pPr>
-            <a:lvl9pPr marL="3886200" indent="-228600" algn="l" defTabSz="457200" rtl="0" eaLnBrk="1" latinLnBrk="0" hangingPunct="1">
-              <a:spcBef>
-                <a:spcPts val="1000"/>
-              </a:spcBef>
-              <a:spcAft>
-                <a:spcPts val="0"/>
-              </a:spcAft>
-              <a:buClr>
-                <a:schemeClr val="accent1"/>
-              </a:buClr>
-              <a:buSzPct val="80000"/>
-              <a:buFont typeface="Wingdings 3" charset="2"/>
-              <a:buChar char=""/>
-              <a:defRPr sz="1200" kern="1200">
-                <a:solidFill>
-                  <a:schemeClr val="tx1">
-                    <a:lumMod val="75000"/>
-                    <a:lumOff val="25000"/>
-                  </a:schemeClr>
-                </a:solidFill>
-                <a:latin typeface="+mn-lt"/>
-                <a:ea typeface="+mn-ea"/>
-                <a:cs typeface="+mn-cs"/>
-              </a:defRPr>
-            </a:lvl9pPr>
-          </a:lstStyle>
-          <a:p>
-            <a:pPr marL="0" indent="0" algn="ctr">
-              <a:buNone/>
-            </a:pPr>
-            <a:r>
-              <a:rPr lang="en-US" sz="2000" dirty="0" smtClean="0">
-                <a:solidFill>
-                  <a:srgbClr val="00B0F0"/>
-                </a:solidFill>
-              </a:rPr>
-              <a:t>Say “Hello” to the Chance &amp; Variance Monster</a:t>
-            </a:r>
-          </a:p>
-          <a:p>
-            <a:pPr marL="0" indent="0" algn="ctr">
-              <a:buNone/>
-            </a:pPr>
-            <a:endParaRPr lang="en-US" sz="2000" dirty="0" smtClean="0"/>
-          </a:p>
-        </p:txBody>
-      </p:sp>
-      <p:pic>
-        <p:nvPicPr>
-          <p:cNvPr id="2" name="Picture 1"/>
-          <p:cNvPicPr>
-            <a:picLocks noChangeAspect="1"/>
-          </p:cNvPicPr>
-          <p:nvPr/>
-        </p:nvPicPr>
-        <p:blipFill>
-          <a:blip r:embed="rId4">
-            <a:extLst>
-              <a:ext uri="{28A0092B-C50C-407E-A947-70E740481C1C}">
-                <a14:useLocalDpi xmlns:a14="http://schemas.microsoft.com/office/drawing/2010/main" val="0"/>
-              </a:ext>
-            </a:extLst>
-          </a:blip>
-          <a:stretch>
-            <a:fillRect/>
-          </a:stretch>
-        </p:blipFill>
-        <p:spPr>
-          <a:xfrm>
-            <a:off x="6283453" y="3439668"/>
-            <a:ext cx="1865376" cy="1822704"/>
-          </a:xfrm>
-          <a:prstGeom prst="rect">
-            <a:avLst/>
-          </a:prstGeom>
-        </p:spPr>
-      </p:pic>
-    </p:spTree>
-    <p:extLst>
-      <p:ext uri="{BB962C8B-B14F-4D97-AF65-F5344CB8AC3E}">
-        <p14:creationId xmlns:p14="http://schemas.microsoft.com/office/powerpoint/2010/main" val="1757281336"/>
-      </p:ext>
-    </p:extLst>
-  </p:cSld>
-  <p:clrMapOvr>
-    <a:masterClrMapping/>
-  </p:clrMapOvr>
-</p:sld>
-</file>
-
-<file path=ppt/slides/slide11.xml><?xml version="1.0" encoding="utf-8"?>
-<p:sld xmlns:a="http://schemas.openxmlformats.org/drawingml/2006/main" xmlns:r="http://schemas.openxmlformats.org/officeDocument/2006/relationships" xmlns:p="http://schemas.openxmlformats.org/presentationml/2006/main">
-  <p:cSld>
-    <p:spTree>
-      <p:nvGrpSpPr>
-        <p:cNvPr id="1" name=""/>
-        <p:cNvGrpSpPr/>
-        <p:nvPr/>
-      </p:nvGrpSpPr>
-      <p:grpSpPr>
-        <a:xfrm>
-          <a:off x="0" y="0"/>
-          <a:ext cx="0" cy="0"/>
-          <a:chOff x="0" y="0"/>
-          <a:chExt cx="0" cy="0"/>
-        </a:xfrm>
-      </p:grpSpPr>
-      <p:sp>
-        <p:nvSpPr>
-          <p:cNvPr id="6" name="Content Placeholder 2"/>
-          <p:cNvSpPr txBox="1">
-            <a:spLocks/>
-          </p:cNvSpPr>
-          <p:nvPr/>
-        </p:nvSpPr>
-        <p:spPr>
-          <a:xfrm>
-            <a:off x="845944" y="1057068"/>
-            <a:ext cx="8596668" cy="3968885"/>
-          </a:xfrm>
-          <a:prstGeom prst="rect">
-            <a:avLst/>
-          </a:prstGeom>
-        </p:spPr>
-        <p:txBody>
-          <a:bodyPr vert="horz" lIns="91440" tIns="45720" rIns="91440" bIns="45720" rtlCol="0">
-            <a:normAutofit/>
-          </a:bodyPr>
-          <a:lstStyle>
-            <a:lvl1pPr marL="342900" indent="-342900" algn="l" defTabSz="457200" rtl="0" eaLnBrk="1" latinLnBrk="0" hangingPunct="1">
-              <a:spcBef>
-                <a:spcPts val="1000"/>
-              </a:spcBef>
-              <a:spcAft>
-                <a:spcPts val="0"/>
-              </a:spcAft>
-              <a:buClr>
-                <a:schemeClr val="accent1"/>
-              </a:buClr>
-              <a:buSzPct val="80000"/>
-              <a:buFont typeface="Wingdings 3" charset="2"/>
-              <a:buChar char=""/>
-              <a:defRPr sz="1800" kern="1200">
-                <a:solidFill>
-                  <a:schemeClr val="tx1">
-                    <a:lumMod val="75000"/>
-                    <a:lumOff val="25000"/>
-                  </a:schemeClr>
-                </a:solidFill>
-                <a:latin typeface="+mn-lt"/>
-                <a:ea typeface="+mn-ea"/>
-                <a:cs typeface="+mn-cs"/>
-              </a:defRPr>
-            </a:lvl1pPr>
-            <a:lvl2pPr marL="742950" indent="-285750" algn="l" defTabSz="457200" rtl="0" eaLnBrk="1" latinLnBrk="0" hangingPunct="1">
-              <a:spcBef>
-                <a:spcPts val="1000"/>
-              </a:spcBef>
-              <a:spcAft>
-                <a:spcPts val="0"/>
-              </a:spcAft>
-              <a:buClr>
-                <a:schemeClr val="accent1"/>
-              </a:buClr>
-              <a:buSzPct val="80000"/>
-              <a:buFont typeface="Wingdings 3" charset="2"/>
-              <a:buChar char=""/>
-              <a:defRPr sz="1600" kern="1200">
-                <a:solidFill>
-                  <a:schemeClr val="tx1">
-                    <a:lumMod val="75000"/>
-                    <a:lumOff val="25000"/>
-                  </a:schemeClr>
-                </a:solidFill>
-                <a:latin typeface="+mn-lt"/>
-                <a:ea typeface="+mn-ea"/>
-                <a:cs typeface="+mn-cs"/>
-              </a:defRPr>
-            </a:lvl2pPr>
-            <a:lvl3pPr marL="1143000" indent="-228600" algn="l" defTabSz="457200" rtl="0" eaLnBrk="1" latinLnBrk="0" hangingPunct="1">
-              <a:spcBef>
-                <a:spcPts val="1000"/>
-              </a:spcBef>
-              <a:spcAft>
-                <a:spcPts val="0"/>
-              </a:spcAft>
-              <a:buClr>
-                <a:schemeClr val="accent1"/>
-              </a:buClr>
-              <a:buSzPct val="80000"/>
-              <a:buFont typeface="Wingdings 3" charset="2"/>
-              <a:buChar char=""/>
-              <a:defRPr sz="1400" kern="1200">
-                <a:solidFill>
-                  <a:schemeClr val="tx1">
-                    <a:lumMod val="75000"/>
-                    <a:lumOff val="25000"/>
-                  </a:schemeClr>
-                </a:solidFill>
-                <a:latin typeface="+mn-lt"/>
-                <a:ea typeface="+mn-ea"/>
-                <a:cs typeface="+mn-cs"/>
-              </a:defRPr>
-            </a:lvl3pPr>
-            <a:lvl4pPr marL="1600200" indent="-228600" algn="l" defTabSz="457200" rtl="0" eaLnBrk="1" latinLnBrk="0" hangingPunct="1">
-              <a:spcBef>
-                <a:spcPts val="1000"/>
-              </a:spcBef>
-              <a:spcAft>
-                <a:spcPts val="0"/>
-              </a:spcAft>
-              <a:buClr>
-                <a:schemeClr val="accent1"/>
-              </a:buClr>
-              <a:buSzPct val="80000"/>
-              <a:buFont typeface="Wingdings 3" charset="2"/>
-              <a:buChar char=""/>
-              <a:defRPr sz="1200" kern="1200">
-                <a:solidFill>
-                  <a:schemeClr val="tx1">
-                    <a:lumMod val="75000"/>
-                    <a:lumOff val="25000"/>
-                  </a:schemeClr>
-                </a:solidFill>
-                <a:latin typeface="+mn-lt"/>
-                <a:ea typeface="+mn-ea"/>
-                <a:cs typeface="+mn-cs"/>
-              </a:defRPr>
-            </a:lvl4pPr>
-            <a:lvl5pPr marL="2057400" indent="-228600" algn="l" defTabSz="457200" rtl="0" eaLnBrk="1" latinLnBrk="0" hangingPunct="1">
-              <a:spcBef>
-                <a:spcPts val="1000"/>
-              </a:spcBef>
-              <a:spcAft>
-                <a:spcPts val="0"/>
-              </a:spcAft>
-              <a:buClr>
-                <a:schemeClr val="accent1"/>
-              </a:buClr>
-              <a:buSzPct val="80000"/>
-              <a:buFont typeface="Wingdings 3" charset="2"/>
-              <a:buChar char=""/>
-              <a:defRPr sz="1200" kern="1200">
-                <a:solidFill>
-                  <a:schemeClr val="tx1">
-                    <a:lumMod val="75000"/>
-                    <a:lumOff val="25000"/>
-                  </a:schemeClr>
-                </a:solidFill>
-                <a:latin typeface="+mn-lt"/>
-                <a:ea typeface="+mn-ea"/>
-                <a:cs typeface="+mn-cs"/>
-              </a:defRPr>
-            </a:lvl5pPr>
-            <a:lvl6pPr marL="2514600" indent="-228600" algn="l" defTabSz="457200" rtl="0" eaLnBrk="1" latinLnBrk="0" hangingPunct="1">
-              <a:spcBef>
-                <a:spcPts val="1000"/>
-              </a:spcBef>
-              <a:spcAft>
-                <a:spcPts val="0"/>
-              </a:spcAft>
-              <a:buClr>
-                <a:schemeClr val="accent1"/>
-              </a:buClr>
-              <a:buSzPct val="80000"/>
-              <a:buFont typeface="Wingdings 3" charset="2"/>
-              <a:buChar char=""/>
-              <a:defRPr sz="1200" kern="1200">
-                <a:solidFill>
-                  <a:schemeClr val="tx1">
-                    <a:lumMod val="75000"/>
-                    <a:lumOff val="25000"/>
-                  </a:schemeClr>
-                </a:solidFill>
-                <a:latin typeface="+mn-lt"/>
-                <a:ea typeface="+mn-ea"/>
-                <a:cs typeface="+mn-cs"/>
-              </a:defRPr>
-            </a:lvl6pPr>
-            <a:lvl7pPr marL="2971800" indent="-228600" algn="l" defTabSz="457200" rtl="0" eaLnBrk="1" latinLnBrk="0" hangingPunct="1">
-              <a:spcBef>
-                <a:spcPts val="1000"/>
-              </a:spcBef>
-              <a:spcAft>
-                <a:spcPts val="0"/>
-              </a:spcAft>
-              <a:buClr>
-                <a:schemeClr val="accent1"/>
-              </a:buClr>
-              <a:buSzPct val="80000"/>
-              <a:buFont typeface="Wingdings 3" charset="2"/>
-              <a:buChar char=""/>
-              <a:defRPr sz="1200" kern="1200">
-                <a:solidFill>
-                  <a:schemeClr val="tx1">
-                    <a:lumMod val="75000"/>
-                    <a:lumOff val="25000"/>
-                  </a:schemeClr>
-                </a:solidFill>
-                <a:latin typeface="+mn-lt"/>
-                <a:ea typeface="+mn-ea"/>
-                <a:cs typeface="+mn-cs"/>
-              </a:defRPr>
-            </a:lvl7pPr>
-            <a:lvl8pPr marL="3429000" indent="-228600" algn="l" defTabSz="457200" rtl="0" eaLnBrk="1" latinLnBrk="0" hangingPunct="1">
-              <a:spcBef>
-                <a:spcPts val="1000"/>
-              </a:spcBef>
-              <a:spcAft>
-                <a:spcPts val="0"/>
-              </a:spcAft>
-              <a:buClr>
-                <a:schemeClr val="accent1"/>
-              </a:buClr>
-              <a:buSzPct val="80000"/>
-              <a:buFont typeface="Wingdings 3" charset="2"/>
-              <a:buChar char=""/>
-              <a:defRPr sz="1200" kern="1200">
-                <a:solidFill>
-                  <a:schemeClr val="tx1">
-                    <a:lumMod val="75000"/>
-                    <a:lumOff val="25000"/>
-                  </a:schemeClr>
-                </a:solidFill>
-                <a:latin typeface="+mn-lt"/>
-                <a:ea typeface="+mn-ea"/>
-                <a:cs typeface="+mn-cs"/>
-              </a:defRPr>
-            </a:lvl8pPr>
-            <a:lvl9pPr marL="3886200" indent="-228600" algn="l" defTabSz="457200" rtl="0" eaLnBrk="1" latinLnBrk="0" hangingPunct="1">
-              <a:spcBef>
-                <a:spcPts val="1000"/>
-              </a:spcBef>
-              <a:spcAft>
-                <a:spcPts val="0"/>
-              </a:spcAft>
-              <a:buClr>
-                <a:schemeClr val="accent1"/>
-              </a:buClr>
-              <a:buSzPct val="80000"/>
-              <a:buFont typeface="Wingdings 3" charset="2"/>
-              <a:buChar char=""/>
-              <a:defRPr sz="1200" kern="1200">
-                <a:solidFill>
-                  <a:schemeClr val="tx1">
-                    <a:lumMod val="75000"/>
-                    <a:lumOff val="25000"/>
-                  </a:schemeClr>
-                </a:solidFill>
-                <a:latin typeface="+mn-lt"/>
-                <a:ea typeface="+mn-ea"/>
-                <a:cs typeface="+mn-cs"/>
-              </a:defRPr>
-            </a:lvl9pPr>
-          </a:lstStyle>
-          <a:p>
-            <a:pPr marL="0" indent="0">
-              <a:buNone/>
-            </a:pPr>
-            <a:endParaRPr lang="en-US" sz="3200" dirty="0" smtClean="0">
-              <a:solidFill>
-                <a:schemeClr val="accent6">
-                  <a:lumMod val="50000"/>
-                </a:schemeClr>
-              </a:solidFill>
-            </a:endParaRPr>
-          </a:p>
-          <a:p>
-            <a:pPr marL="0" indent="0">
-              <a:buNone/>
-            </a:pPr>
-            <a:r>
-              <a:rPr lang="en-US" sz="2400" dirty="0" smtClean="0"/>
-              <a:t>Definition: </a:t>
-            </a:r>
-            <a:r>
-              <a:rPr lang="en-US" sz="2400" i="1" dirty="0" smtClean="0">
-                <a:solidFill>
-                  <a:schemeClr val="accent6">
-                    <a:lumMod val="75000"/>
-                  </a:schemeClr>
-                </a:solidFill>
-              </a:rPr>
-              <a:t>Confidence Interval </a:t>
-            </a:r>
-            <a:r>
-              <a:rPr lang="en-US" sz="2400" i="1" dirty="0">
-                <a:solidFill>
-                  <a:schemeClr val="accent6">
-                    <a:lumMod val="75000"/>
-                  </a:schemeClr>
-                </a:solidFill>
-              </a:rPr>
-              <a:t>(CI)</a:t>
-            </a:r>
-            <a:r>
-              <a:rPr lang="en-US" sz="2400" dirty="0"/>
-              <a:t> </a:t>
-            </a:r>
-            <a:endParaRPr lang="en-US" sz="2400" dirty="0" smtClean="0"/>
-          </a:p>
-          <a:p>
-            <a:pPr marL="0" indent="0">
-              <a:buNone/>
-            </a:pPr>
-            <a:r>
-              <a:rPr lang="en-US" sz="2400" dirty="0" smtClean="0"/>
-              <a:t>An interval which has an </a:t>
-            </a:r>
-            <a:r>
-              <a:rPr lang="el-GR" sz="2400" i="1" dirty="0" smtClean="0">
-                <a:solidFill>
-                  <a:schemeClr val="tx1"/>
-                </a:solidFill>
-              </a:rPr>
-              <a:t>χ</a:t>
-            </a:r>
-            <a:r>
-              <a:rPr lang="en-US" sz="2400" dirty="0" smtClean="0"/>
-              <a:t>% chance of containing the population parameter of interest.  (90%, 95%, and 99% are popular options for </a:t>
-            </a:r>
-            <a:r>
-              <a:rPr lang="el-GR" sz="2400" i="1" dirty="0" smtClean="0">
-                <a:solidFill>
-                  <a:schemeClr val="tx1"/>
-                </a:solidFill>
-              </a:rPr>
-              <a:t>χ</a:t>
-            </a:r>
-            <a:r>
-              <a:rPr lang="en-US" sz="2400" dirty="0" smtClean="0"/>
-              <a:t>)</a:t>
-            </a:r>
-          </a:p>
-          <a:p>
-            <a:pPr marL="0" indent="0">
-              <a:buNone/>
-            </a:pPr>
-            <a:endParaRPr lang="en-US" sz="2400" dirty="0" smtClean="0"/>
-          </a:p>
-          <a:p>
-            <a:pPr marL="0" indent="0">
-              <a:buNone/>
-            </a:pPr>
-            <a:r>
-              <a:rPr lang="en-US" dirty="0">
-                <a:solidFill>
-                  <a:schemeClr val="tx1">
-                    <a:lumMod val="65000"/>
-                    <a:lumOff val="35000"/>
-                  </a:schemeClr>
-                </a:solidFill>
-              </a:rPr>
-              <a:t>Source: https://rpsychologist.com/d3/CI/</a:t>
-            </a:r>
-          </a:p>
-          <a:p>
-            <a:pPr marL="0" indent="0">
-              <a:buNone/>
-            </a:pPr>
-            <a:endParaRPr lang="en-US" sz="2400" dirty="0" smtClean="0"/>
-          </a:p>
-          <a:p>
-            <a:pPr marL="0" indent="0">
-              <a:buNone/>
-            </a:pPr>
-            <a:endParaRPr lang="en-US" sz="2400" dirty="0"/>
-          </a:p>
-        </p:txBody>
-      </p:sp>
-    </p:spTree>
-    <p:extLst>
-      <p:ext uri="{BB962C8B-B14F-4D97-AF65-F5344CB8AC3E}">
-        <p14:creationId xmlns:p14="http://schemas.microsoft.com/office/powerpoint/2010/main" val="328801521"/>
-      </p:ext>
-    </p:extLst>
-  </p:cSld>
-  <p:clrMapOvr>
-    <a:masterClrMapping/>
-  </p:clrMapOvr>
-</p:sld>
-</file>
-
-<file path=ppt/slides/slide12.xml><?xml version="1.0" encoding="utf-8"?>
-<p:sld xmlns:a="http://schemas.openxmlformats.org/drawingml/2006/main" xmlns:r="http://schemas.openxmlformats.org/officeDocument/2006/relationships" xmlns:p="http://schemas.openxmlformats.org/presentationml/2006/main">
-  <p:cSld>
-    <p:spTree>
-      <p:nvGrpSpPr>
-        <p:cNvPr id="1" name=""/>
-        <p:cNvGrpSpPr/>
-        <p:nvPr/>
-      </p:nvGrpSpPr>
-      <p:grpSpPr>
-        <a:xfrm>
-          <a:off x="0" y="0"/>
-          <a:ext cx="0" cy="0"/>
-          <a:chOff x="0" y="0"/>
-          <a:chExt cx="0" cy="0"/>
-        </a:xfrm>
-      </p:grpSpPr>
       <p:sp>
         <p:nvSpPr>
           <p:cNvPr id="2" name="Title 1"/>
@@ -9408,7 +8817,7 @@
 </p:sld>
 </file>
 
-<file path=ppt/slides/slide13.xml><?xml version="1.0" encoding="utf-8"?>
+<file path=ppt/slides/slide11.xml><?xml version="1.0" encoding="utf-8"?>
 <p:sld xmlns:a="http://schemas.openxmlformats.org/drawingml/2006/main" xmlns:r="http://schemas.openxmlformats.org/officeDocument/2006/relationships" xmlns:p="http://schemas.openxmlformats.org/presentationml/2006/main">
   <p:cSld>
     <p:spTree>
@@ -9529,7 +8938,7 @@
 </p:sld>
 </file>
 
-<file path=ppt/slides/slide14.xml><?xml version="1.0" encoding="utf-8"?>
+<file path=ppt/slides/slide12.xml><?xml version="1.0" encoding="utf-8"?>
 <p:sld xmlns:a="http://schemas.openxmlformats.org/drawingml/2006/main" xmlns:r="http://schemas.openxmlformats.org/officeDocument/2006/relationships" xmlns:p="http://schemas.openxmlformats.org/presentationml/2006/main">
   <p:cSld>
     <p:spTree>
@@ -9546,26 +8955,56 @@
           <a:chExt cx="0" cy="0"/>
         </a:xfrm>
       </p:grpSpPr>
-      <p:sp>
-        <p:nvSpPr>
-          <p:cNvPr id="5" name="Content Placeholder 2"/>
-          <p:cNvSpPr txBox="1">
-            <a:spLocks/>
-          </p:cNvSpPr>
+      <p:pic>
+        <p:nvPicPr>
+          <p:cNvPr id="4" name="Picture 3"/>
+          <p:cNvPicPr>
+            <a:picLocks noChangeAspect="1"/>
+          </p:cNvPicPr>
           <p:nvPr/>
-        </p:nvSpPr>
+        </p:nvPicPr>
+        <p:blipFill>
+          <a:blip r:embed="rId3">
+            <a:extLst>
+              <a:ext uri="{28A0092B-C50C-407E-A947-70E740481C1C}">
+                <a14:useLocalDpi xmlns:a14="http://schemas.microsoft.com/office/drawing/2010/main" val="0"/>
+              </a:ext>
+            </a:extLst>
+          </a:blip>
+          <a:stretch>
+            <a:fillRect/>
+          </a:stretch>
+        </p:blipFill>
         <p:spPr>
           <a:xfrm>
-            <a:off x="890635" y="4696693"/>
-            <a:ext cx="8596668" cy="972589"/>
+            <a:off x="1238110" y="757927"/>
+            <a:ext cx="4375926" cy="3581907"/>
           </a:xfrm>
           <a:prstGeom prst="rect">
             <a:avLst/>
           </a:prstGeom>
         </p:spPr>
+      </p:pic>
+      <p:sp>
+        <p:nvSpPr>
+          <p:cNvPr id="5" name="Content Placeholder 2"/>
+          <p:cNvSpPr txBox="1">
+            <a:spLocks/>
+          </p:cNvSpPr>
+          <p:nvPr/>
+        </p:nvSpPr>
+        <p:spPr>
+          <a:xfrm>
+            <a:off x="4796446" y="5262371"/>
+            <a:ext cx="4918190" cy="440159"/>
+          </a:xfrm>
+          <a:prstGeom prst="rect">
+            <a:avLst/>
+          </a:prstGeom>
+        </p:spPr>
         <p:txBody>
           <a:bodyPr vert="horz" lIns="91440" tIns="45720" rIns="91440" bIns="45720" rtlCol="0">
-            <a:normAutofit/>
+            <a:normAutofit fontScale="85000" lnSpcReduction="10000"/>
           </a:bodyPr>
           <a:lstStyle>
             <a:lvl1pPr marL="342900" indent="-342900" algn="l" defTabSz="457200" rtl="0" eaLnBrk="1" latinLnBrk="0" hangingPunct="1">
@@ -9795,6 +9234,728 @@
             </a:lvl9pPr>
           </a:lstStyle>
           <a:p>
+            <a:pPr marL="0" indent="0" algn="ctr">
+              <a:buNone/>
+            </a:pPr>
+            <a:r>
+              <a:rPr lang="en-US" sz="2000" dirty="0" smtClean="0">
+                <a:solidFill>
+                  <a:srgbClr val="00B0F0"/>
+                </a:solidFill>
+              </a:rPr>
+              <a:t>Say “Hello” to the Chance &amp; Variance Monster</a:t>
+            </a:r>
+          </a:p>
+          <a:p>
+            <a:pPr marL="0" indent="0" algn="ctr">
+              <a:buNone/>
+            </a:pPr>
+            <a:endParaRPr lang="en-US" sz="2000" dirty="0" smtClean="0"/>
+          </a:p>
+        </p:txBody>
+      </p:sp>
+      <p:pic>
+        <p:nvPicPr>
+          <p:cNvPr id="2" name="Picture 1"/>
+          <p:cNvPicPr>
+            <a:picLocks noChangeAspect="1"/>
+          </p:cNvPicPr>
+          <p:nvPr/>
+        </p:nvPicPr>
+        <p:blipFill>
+          <a:blip r:embed="rId4">
+            <a:extLst>
+              <a:ext uri="{28A0092B-C50C-407E-A947-70E740481C1C}">
+                <a14:useLocalDpi xmlns:a14="http://schemas.microsoft.com/office/drawing/2010/main" val="0"/>
+              </a:ext>
+            </a:extLst>
+          </a:blip>
+          <a:stretch>
+            <a:fillRect/>
+          </a:stretch>
+        </p:blipFill>
+        <p:spPr>
+          <a:xfrm>
+            <a:off x="6283453" y="3439668"/>
+            <a:ext cx="1865376" cy="1822704"/>
+          </a:xfrm>
+          <a:prstGeom prst="rect">
+            <a:avLst/>
+          </a:prstGeom>
+        </p:spPr>
+      </p:pic>
+    </p:spTree>
+    <p:extLst>
+      <p:ext uri="{BB962C8B-B14F-4D97-AF65-F5344CB8AC3E}">
+        <p14:creationId xmlns:p14="http://schemas.microsoft.com/office/powerpoint/2010/main" val="1757281336"/>
+      </p:ext>
+    </p:extLst>
+  </p:cSld>
+  <p:clrMapOvr>
+    <a:masterClrMapping/>
+  </p:clrMapOvr>
+</p:sld>
+</file>
+
+<file path=ppt/slides/slide13.xml><?xml version="1.0" encoding="utf-8"?>
+<p:sld xmlns:a="http://schemas.openxmlformats.org/drawingml/2006/main" xmlns:r="http://schemas.openxmlformats.org/officeDocument/2006/relationships" xmlns:p="http://schemas.openxmlformats.org/presentationml/2006/main">
+  <p:cSld>
+    <p:spTree>
+      <p:nvGrpSpPr>
+        <p:cNvPr id="1" name=""/>
+        <p:cNvGrpSpPr/>
+        <p:nvPr/>
+      </p:nvGrpSpPr>
+      <p:grpSpPr>
+        <a:xfrm>
+          <a:off x="0" y="0"/>
+          <a:ext cx="0" cy="0"/>
+          <a:chOff x="0" y="0"/>
+          <a:chExt cx="0" cy="0"/>
+        </a:xfrm>
+      </p:grpSpPr>
+      <p:sp>
+        <p:nvSpPr>
+          <p:cNvPr id="6" name="Content Placeholder 2"/>
+          <p:cNvSpPr txBox="1">
+            <a:spLocks/>
+          </p:cNvSpPr>
+          <p:nvPr/>
+        </p:nvSpPr>
+        <p:spPr>
+          <a:xfrm>
+            <a:off x="845944" y="1057068"/>
+            <a:ext cx="8596668" cy="3968885"/>
+          </a:xfrm>
+          <a:prstGeom prst="rect">
+            <a:avLst/>
+          </a:prstGeom>
+        </p:spPr>
+        <p:txBody>
+          <a:bodyPr vert="horz" lIns="91440" tIns="45720" rIns="91440" bIns="45720" rtlCol="0">
+            <a:normAutofit/>
+          </a:bodyPr>
+          <a:lstStyle>
+            <a:lvl1pPr marL="342900" indent="-342900" algn="l" defTabSz="457200" rtl="0" eaLnBrk="1" latinLnBrk="0" hangingPunct="1">
+              <a:spcBef>
+                <a:spcPts val="1000"/>
+              </a:spcBef>
+              <a:spcAft>
+                <a:spcPts val="0"/>
+              </a:spcAft>
+              <a:buClr>
+                <a:schemeClr val="accent1"/>
+              </a:buClr>
+              <a:buSzPct val="80000"/>
+              <a:buFont typeface="Wingdings 3" charset="2"/>
+              <a:buChar char=""/>
+              <a:defRPr sz="1800" kern="1200">
+                <a:solidFill>
+                  <a:schemeClr val="tx1">
+                    <a:lumMod val="75000"/>
+                    <a:lumOff val="25000"/>
+                  </a:schemeClr>
+                </a:solidFill>
+                <a:latin typeface="+mn-lt"/>
+                <a:ea typeface="+mn-ea"/>
+                <a:cs typeface="+mn-cs"/>
+              </a:defRPr>
+            </a:lvl1pPr>
+            <a:lvl2pPr marL="742950" indent="-285750" algn="l" defTabSz="457200" rtl="0" eaLnBrk="1" latinLnBrk="0" hangingPunct="1">
+              <a:spcBef>
+                <a:spcPts val="1000"/>
+              </a:spcBef>
+              <a:spcAft>
+                <a:spcPts val="0"/>
+              </a:spcAft>
+              <a:buClr>
+                <a:schemeClr val="accent1"/>
+              </a:buClr>
+              <a:buSzPct val="80000"/>
+              <a:buFont typeface="Wingdings 3" charset="2"/>
+              <a:buChar char=""/>
+              <a:defRPr sz="1600" kern="1200">
+                <a:solidFill>
+                  <a:schemeClr val="tx1">
+                    <a:lumMod val="75000"/>
+                    <a:lumOff val="25000"/>
+                  </a:schemeClr>
+                </a:solidFill>
+                <a:latin typeface="+mn-lt"/>
+                <a:ea typeface="+mn-ea"/>
+                <a:cs typeface="+mn-cs"/>
+              </a:defRPr>
+            </a:lvl2pPr>
+            <a:lvl3pPr marL="1143000" indent="-228600" algn="l" defTabSz="457200" rtl="0" eaLnBrk="1" latinLnBrk="0" hangingPunct="1">
+              <a:spcBef>
+                <a:spcPts val="1000"/>
+              </a:spcBef>
+              <a:spcAft>
+                <a:spcPts val="0"/>
+              </a:spcAft>
+              <a:buClr>
+                <a:schemeClr val="accent1"/>
+              </a:buClr>
+              <a:buSzPct val="80000"/>
+              <a:buFont typeface="Wingdings 3" charset="2"/>
+              <a:buChar char=""/>
+              <a:defRPr sz="1400" kern="1200">
+                <a:solidFill>
+                  <a:schemeClr val="tx1">
+                    <a:lumMod val="75000"/>
+                    <a:lumOff val="25000"/>
+                  </a:schemeClr>
+                </a:solidFill>
+                <a:latin typeface="+mn-lt"/>
+                <a:ea typeface="+mn-ea"/>
+                <a:cs typeface="+mn-cs"/>
+              </a:defRPr>
+            </a:lvl3pPr>
+            <a:lvl4pPr marL="1600200" indent="-228600" algn="l" defTabSz="457200" rtl="0" eaLnBrk="1" latinLnBrk="0" hangingPunct="1">
+              <a:spcBef>
+                <a:spcPts val="1000"/>
+              </a:spcBef>
+              <a:spcAft>
+                <a:spcPts val="0"/>
+              </a:spcAft>
+              <a:buClr>
+                <a:schemeClr val="accent1"/>
+              </a:buClr>
+              <a:buSzPct val="80000"/>
+              <a:buFont typeface="Wingdings 3" charset="2"/>
+              <a:buChar char=""/>
+              <a:defRPr sz="1200" kern="1200">
+                <a:solidFill>
+                  <a:schemeClr val="tx1">
+                    <a:lumMod val="75000"/>
+                    <a:lumOff val="25000"/>
+                  </a:schemeClr>
+                </a:solidFill>
+                <a:latin typeface="+mn-lt"/>
+                <a:ea typeface="+mn-ea"/>
+                <a:cs typeface="+mn-cs"/>
+              </a:defRPr>
+            </a:lvl4pPr>
+            <a:lvl5pPr marL="2057400" indent="-228600" algn="l" defTabSz="457200" rtl="0" eaLnBrk="1" latinLnBrk="0" hangingPunct="1">
+              <a:spcBef>
+                <a:spcPts val="1000"/>
+              </a:spcBef>
+              <a:spcAft>
+                <a:spcPts val="0"/>
+              </a:spcAft>
+              <a:buClr>
+                <a:schemeClr val="accent1"/>
+              </a:buClr>
+              <a:buSzPct val="80000"/>
+              <a:buFont typeface="Wingdings 3" charset="2"/>
+              <a:buChar char=""/>
+              <a:defRPr sz="1200" kern="1200">
+                <a:solidFill>
+                  <a:schemeClr val="tx1">
+                    <a:lumMod val="75000"/>
+                    <a:lumOff val="25000"/>
+                  </a:schemeClr>
+                </a:solidFill>
+                <a:latin typeface="+mn-lt"/>
+                <a:ea typeface="+mn-ea"/>
+                <a:cs typeface="+mn-cs"/>
+              </a:defRPr>
+            </a:lvl5pPr>
+            <a:lvl6pPr marL="2514600" indent="-228600" algn="l" defTabSz="457200" rtl="0" eaLnBrk="1" latinLnBrk="0" hangingPunct="1">
+              <a:spcBef>
+                <a:spcPts val="1000"/>
+              </a:spcBef>
+              <a:spcAft>
+                <a:spcPts val="0"/>
+              </a:spcAft>
+              <a:buClr>
+                <a:schemeClr val="accent1"/>
+              </a:buClr>
+              <a:buSzPct val="80000"/>
+              <a:buFont typeface="Wingdings 3" charset="2"/>
+              <a:buChar char=""/>
+              <a:defRPr sz="1200" kern="1200">
+                <a:solidFill>
+                  <a:schemeClr val="tx1">
+                    <a:lumMod val="75000"/>
+                    <a:lumOff val="25000"/>
+                  </a:schemeClr>
+                </a:solidFill>
+                <a:latin typeface="+mn-lt"/>
+                <a:ea typeface="+mn-ea"/>
+                <a:cs typeface="+mn-cs"/>
+              </a:defRPr>
+            </a:lvl6pPr>
+            <a:lvl7pPr marL="2971800" indent="-228600" algn="l" defTabSz="457200" rtl="0" eaLnBrk="1" latinLnBrk="0" hangingPunct="1">
+              <a:spcBef>
+                <a:spcPts val="1000"/>
+              </a:spcBef>
+              <a:spcAft>
+                <a:spcPts val="0"/>
+              </a:spcAft>
+              <a:buClr>
+                <a:schemeClr val="accent1"/>
+              </a:buClr>
+              <a:buSzPct val="80000"/>
+              <a:buFont typeface="Wingdings 3" charset="2"/>
+              <a:buChar char=""/>
+              <a:defRPr sz="1200" kern="1200">
+                <a:solidFill>
+                  <a:schemeClr val="tx1">
+                    <a:lumMod val="75000"/>
+                    <a:lumOff val="25000"/>
+                  </a:schemeClr>
+                </a:solidFill>
+                <a:latin typeface="+mn-lt"/>
+                <a:ea typeface="+mn-ea"/>
+                <a:cs typeface="+mn-cs"/>
+              </a:defRPr>
+            </a:lvl7pPr>
+            <a:lvl8pPr marL="3429000" indent="-228600" algn="l" defTabSz="457200" rtl="0" eaLnBrk="1" latinLnBrk="0" hangingPunct="1">
+              <a:spcBef>
+                <a:spcPts val="1000"/>
+              </a:spcBef>
+              <a:spcAft>
+                <a:spcPts val="0"/>
+              </a:spcAft>
+              <a:buClr>
+                <a:schemeClr val="accent1"/>
+              </a:buClr>
+              <a:buSzPct val="80000"/>
+              <a:buFont typeface="Wingdings 3" charset="2"/>
+              <a:buChar char=""/>
+              <a:defRPr sz="1200" kern="1200">
+                <a:solidFill>
+                  <a:schemeClr val="tx1">
+                    <a:lumMod val="75000"/>
+                    <a:lumOff val="25000"/>
+                  </a:schemeClr>
+                </a:solidFill>
+                <a:latin typeface="+mn-lt"/>
+                <a:ea typeface="+mn-ea"/>
+                <a:cs typeface="+mn-cs"/>
+              </a:defRPr>
+            </a:lvl8pPr>
+            <a:lvl9pPr marL="3886200" indent="-228600" algn="l" defTabSz="457200" rtl="0" eaLnBrk="1" latinLnBrk="0" hangingPunct="1">
+              <a:spcBef>
+                <a:spcPts val="1000"/>
+              </a:spcBef>
+              <a:spcAft>
+                <a:spcPts val="0"/>
+              </a:spcAft>
+              <a:buClr>
+                <a:schemeClr val="accent1"/>
+              </a:buClr>
+              <a:buSzPct val="80000"/>
+              <a:buFont typeface="Wingdings 3" charset="2"/>
+              <a:buChar char=""/>
+              <a:defRPr sz="1200" kern="1200">
+                <a:solidFill>
+                  <a:schemeClr val="tx1">
+                    <a:lumMod val="75000"/>
+                    <a:lumOff val="25000"/>
+                  </a:schemeClr>
+                </a:solidFill>
+                <a:latin typeface="+mn-lt"/>
+                <a:ea typeface="+mn-ea"/>
+                <a:cs typeface="+mn-cs"/>
+              </a:defRPr>
+            </a:lvl9pPr>
+          </a:lstStyle>
+          <a:p>
+            <a:pPr marL="0" indent="0">
+              <a:buNone/>
+            </a:pPr>
+            <a:endParaRPr lang="en-US" sz="3200" dirty="0" smtClean="0">
+              <a:solidFill>
+                <a:schemeClr val="accent6">
+                  <a:lumMod val="50000"/>
+                </a:schemeClr>
+              </a:solidFill>
+            </a:endParaRPr>
+          </a:p>
+          <a:p>
+            <a:pPr marL="0" indent="0">
+              <a:buNone/>
+            </a:pPr>
+            <a:r>
+              <a:rPr lang="en-US" sz="2400" dirty="0" smtClean="0"/>
+              <a:t>Definition: </a:t>
+            </a:r>
+            <a:r>
+              <a:rPr lang="en-US" sz="2400" i="1" dirty="0" smtClean="0">
+                <a:solidFill>
+                  <a:schemeClr val="accent6">
+                    <a:lumMod val="75000"/>
+                  </a:schemeClr>
+                </a:solidFill>
+              </a:rPr>
+              <a:t>Confidence Interval </a:t>
+            </a:r>
+            <a:r>
+              <a:rPr lang="en-US" sz="2400" i="1" dirty="0">
+                <a:solidFill>
+                  <a:schemeClr val="accent6">
+                    <a:lumMod val="75000"/>
+                  </a:schemeClr>
+                </a:solidFill>
+              </a:rPr>
+              <a:t>(CI)</a:t>
+            </a:r>
+            <a:r>
+              <a:rPr lang="en-US" sz="2400" dirty="0"/>
+              <a:t> </a:t>
+            </a:r>
+            <a:endParaRPr lang="en-US" sz="2400" dirty="0" smtClean="0"/>
+          </a:p>
+          <a:p>
+            <a:pPr marL="0" indent="0">
+              <a:buNone/>
+            </a:pPr>
+            <a:r>
+              <a:rPr lang="en-US" sz="2400" dirty="0" smtClean="0"/>
+              <a:t>An interval which has an </a:t>
+            </a:r>
+            <a:r>
+              <a:rPr lang="el-GR" sz="2400" i="1" dirty="0" smtClean="0">
+                <a:solidFill>
+                  <a:schemeClr val="tx1"/>
+                </a:solidFill>
+              </a:rPr>
+              <a:t>χ</a:t>
+            </a:r>
+            <a:r>
+              <a:rPr lang="en-US" sz="2400" dirty="0" smtClean="0"/>
+              <a:t>% chance of containing the population parameter of interest.  (90%, 95%, and 99% are popular options for </a:t>
+            </a:r>
+            <a:r>
+              <a:rPr lang="el-GR" sz="2400" i="1" dirty="0" smtClean="0">
+                <a:solidFill>
+                  <a:schemeClr val="tx1"/>
+                </a:solidFill>
+              </a:rPr>
+              <a:t>χ</a:t>
+            </a:r>
+            <a:r>
+              <a:rPr lang="en-US" sz="2400" dirty="0" smtClean="0"/>
+              <a:t>)</a:t>
+            </a:r>
+          </a:p>
+          <a:p>
+            <a:pPr marL="0" indent="0">
+              <a:buNone/>
+            </a:pPr>
+            <a:endParaRPr lang="en-US" sz="2400" dirty="0" smtClean="0"/>
+          </a:p>
+          <a:p>
+            <a:pPr marL="0" indent="0">
+              <a:buNone/>
+            </a:pPr>
+            <a:r>
+              <a:rPr lang="en-US" dirty="0">
+                <a:solidFill>
+                  <a:schemeClr val="tx1">
+                    <a:lumMod val="65000"/>
+                    <a:lumOff val="35000"/>
+                  </a:schemeClr>
+                </a:solidFill>
+              </a:rPr>
+              <a:t>Source: https://rpsychologist.com/d3/CI/</a:t>
+            </a:r>
+          </a:p>
+          <a:p>
+            <a:pPr marL="0" indent="0">
+              <a:buNone/>
+            </a:pPr>
+            <a:endParaRPr lang="en-US" sz="2400" dirty="0" smtClean="0"/>
+          </a:p>
+          <a:p>
+            <a:pPr marL="0" indent="0">
+              <a:buNone/>
+            </a:pPr>
+            <a:endParaRPr lang="en-US" sz="2400" dirty="0"/>
+          </a:p>
+        </p:txBody>
+      </p:sp>
+    </p:spTree>
+    <p:extLst>
+      <p:ext uri="{BB962C8B-B14F-4D97-AF65-F5344CB8AC3E}">
+        <p14:creationId xmlns:p14="http://schemas.microsoft.com/office/powerpoint/2010/main" val="328801521"/>
+      </p:ext>
+    </p:extLst>
+  </p:cSld>
+  <p:clrMapOvr>
+    <a:masterClrMapping/>
+  </p:clrMapOvr>
+</p:sld>
+</file>
+
+<file path=ppt/slides/slide14.xml><?xml version="1.0" encoding="utf-8"?>
+<p:sld xmlns:a="http://schemas.openxmlformats.org/drawingml/2006/main" xmlns:r="http://schemas.openxmlformats.org/officeDocument/2006/relationships" xmlns:p="http://schemas.openxmlformats.org/presentationml/2006/main">
+  <p:cSld>
+    <p:spTree>
+      <p:nvGrpSpPr>
+        <p:cNvPr id="1" name=""/>
+        <p:cNvGrpSpPr/>
+        <p:nvPr/>
+      </p:nvGrpSpPr>
+      <p:grpSpPr>
+        <a:xfrm>
+          <a:off x="0" y="0"/>
+          <a:ext cx="0" cy="0"/>
+          <a:chOff x="0" y="0"/>
+          <a:chExt cx="0" cy="0"/>
+        </a:xfrm>
+      </p:grpSpPr>
+      <p:sp>
+        <p:nvSpPr>
+          <p:cNvPr id="5" name="Content Placeholder 2"/>
+          <p:cNvSpPr txBox="1">
+            <a:spLocks/>
+          </p:cNvSpPr>
+          <p:nvPr/>
+        </p:nvSpPr>
+        <p:spPr>
+          <a:xfrm>
+            <a:off x="890635" y="4696693"/>
+            <a:ext cx="8596668" cy="1418357"/>
+          </a:xfrm>
+          <a:prstGeom prst="rect">
+            <a:avLst/>
+          </a:prstGeom>
+        </p:spPr>
+        <p:txBody>
+          <a:bodyPr vert="horz" lIns="91440" tIns="45720" rIns="91440" bIns="45720" rtlCol="0">
+            <a:normAutofit/>
+          </a:bodyPr>
+          <a:lstStyle>
+            <a:lvl1pPr marL="342900" indent="-342900" algn="l" defTabSz="457200" rtl="0" eaLnBrk="1" latinLnBrk="0" hangingPunct="1">
+              <a:spcBef>
+                <a:spcPts val="1000"/>
+              </a:spcBef>
+              <a:spcAft>
+                <a:spcPts val="0"/>
+              </a:spcAft>
+              <a:buClr>
+                <a:schemeClr val="accent1"/>
+              </a:buClr>
+              <a:buSzPct val="80000"/>
+              <a:buFont typeface="Wingdings 3" charset="2"/>
+              <a:buChar char=""/>
+              <a:defRPr sz="1800" kern="1200">
+                <a:solidFill>
+                  <a:schemeClr val="tx1">
+                    <a:lumMod val="75000"/>
+                    <a:lumOff val="25000"/>
+                  </a:schemeClr>
+                </a:solidFill>
+                <a:latin typeface="+mn-lt"/>
+                <a:ea typeface="+mn-ea"/>
+                <a:cs typeface="+mn-cs"/>
+              </a:defRPr>
+            </a:lvl1pPr>
+            <a:lvl2pPr marL="742950" indent="-285750" algn="l" defTabSz="457200" rtl="0" eaLnBrk="1" latinLnBrk="0" hangingPunct="1">
+              <a:spcBef>
+                <a:spcPts val="1000"/>
+              </a:spcBef>
+              <a:spcAft>
+                <a:spcPts val="0"/>
+              </a:spcAft>
+              <a:buClr>
+                <a:schemeClr val="accent1"/>
+              </a:buClr>
+              <a:buSzPct val="80000"/>
+              <a:buFont typeface="Wingdings 3" charset="2"/>
+              <a:buChar char=""/>
+              <a:defRPr sz="1600" kern="1200">
+                <a:solidFill>
+                  <a:schemeClr val="tx1">
+                    <a:lumMod val="75000"/>
+                    <a:lumOff val="25000"/>
+                  </a:schemeClr>
+                </a:solidFill>
+                <a:latin typeface="+mn-lt"/>
+                <a:ea typeface="+mn-ea"/>
+                <a:cs typeface="+mn-cs"/>
+              </a:defRPr>
+            </a:lvl2pPr>
+            <a:lvl3pPr marL="1143000" indent="-228600" algn="l" defTabSz="457200" rtl="0" eaLnBrk="1" latinLnBrk="0" hangingPunct="1">
+              <a:spcBef>
+                <a:spcPts val="1000"/>
+              </a:spcBef>
+              <a:spcAft>
+                <a:spcPts val="0"/>
+              </a:spcAft>
+              <a:buClr>
+                <a:schemeClr val="accent1"/>
+              </a:buClr>
+              <a:buSzPct val="80000"/>
+              <a:buFont typeface="Wingdings 3" charset="2"/>
+              <a:buChar char=""/>
+              <a:defRPr sz="1400" kern="1200">
+                <a:solidFill>
+                  <a:schemeClr val="tx1">
+                    <a:lumMod val="75000"/>
+                    <a:lumOff val="25000"/>
+                  </a:schemeClr>
+                </a:solidFill>
+                <a:latin typeface="+mn-lt"/>
+                <a:ea typeface="+mn-ea"/>
+                <a:cs typeface="+mn-cs"/>
+              </a:defRPr>
+            </a:lvl3pPr>
+            <a:lvl4pPr marL="1600200" indent="-228600" algn="l" defTabSz="457200" rtl="0" eaLnBrk="1" latinLnBrk="0" hangingPunct="1">
+              <a:spcBef>
+                <a:spcPts val="1000"/>
+              </a:spcBef>
+              <a:spcAft>
+                <a:spcPts val="0"/>
+              </a:spcAft>
+              <a:buClr>
+                <a:schemeClr val="accent1"/>
+              </a:buClr>
+              <a:buSzPct val="80000"/>
+              <a:buFont typeface="Wingdings 3" charset="2"/>
+              <a:buChar char=""/>
+              <a:defRPr sz="1200" kern="1200">
+                <a:solidFill>
+                  <a:schemeClr val="tx1">
+                    <a:lumMod val="75000"/>
+                    <a:lumOff val="25000"/>
+                  </a:schemeClr>
+                </a:solidFill>
+                <a:latin typeface="+mn-lt"/>
+                <a:ea typeface="+mn-ea"/>
+                <a:cs typeface="+mn-cs"/>
+              </a:defRPr>
+            </a:lvl4pPr>
+            <a:lvl5pPr marL="2057400" indent="-228600" algn="l" defTabSz="457200" rtl="0" eaLnBrk="1" latinLnBrk="0" hangingPunct="1">
+              <a:spcBef>
+                <a:spcPts val="1000"/>
+              </a:spcBef>
+              <a:spcAft>
+                <a:spcPts val="0"/>
+              </a:spcAft>
+              <a:buClr>
+                <a:schemeClr val="accent1"/>
+              </a:buClr>
+              <a:buSzPct val="80000"/>
+              <a:buFont typeface="Wingdings 3" charset="2"/>
+              <a:buChar char=""/>
+              <a:defRPr sz="1200" kern="1200">
+                <a:solidFill>
+                  <a:schemeClr val="tx1">
+                    <a:lumMod val="75000"/>
+                    <a:lumOff val="25000"/>
+                  </a:schemeClr>
+                </a:solidFill>
+                <a:latin typeface="+mn-lt"/>
+                <a:ea typeface="+mn-ea"/>
+                <a:cs typeface="+mn-cs"/>
+              </a:defRPr>
+            </a:lvl5pPr>
+            <a:lvl6pPr marL="2514600" indent="-228600" algn="l" defTabSz="457200" rtl="0" eaLnBrk="1" latinLnBrk="0" hangingPunct="1">
+              <a:spcBef>
+                <a:spcPts val="1000"/>
+              </a:spcBef>
+              <a:spcAft>
+                <a:spcPts val="0"/>
+              </a:spcAft>
+              <a:buClr>
+                <a:schemeClr val="accent1"/>
+              </a:buClr>
+              <a:buSzPct val="80000"/>
+              <a:buFont typeface="Wingdings 3" charset="2"/>
+              <a:buChar char=""/>
+              <a:defRPr sz="1200" kern="1200">
+                <a:solidFill>
+                  <a:schemeClr val="tx1">
+                    <a:lumMod val="75000"/>
+                    <a:lumOff val="25000"/>
+                  </a:schemeClr>
+                </a:solidFill>
+                <a:latin typeface="+mn-lt"/>
+                <a:ea typeface="+mn-ea"/>
+                <a:cs typeface="+mn-cs"/>
+              </a:defRPr>
+            </a:lvl6pPr>
+            <a:lvl7pPr marL="2971800" indent="-228600" algn="l" defTabSz="457200" rtl="0" eaLnBrk="1" latinLnBrk="0" hangingPunct="1">
+              <a:spcBef>
+                <a:spcPts val="1000"/>
+              </a:spcBef>
+              <a:spcAft>
+                <a:spcPts val="0"/>
+              </a:spcAft>
+              <a:buClr>
+                <a:schemeClr val="accent1"/>
+              </a:buClr>
+              <a:buSzPct val="80000"/>
+              <a:buFont typeface="Wingdings 3" charset="2"/>
+              <a:buChar char=""/>
+              <a:defRPr sz="1200" kern="1200">
+                <a:solidFill>
+                  <a:schemeClr val="tx1">
+                    <a:lumMod val="75000"/>
+                    <a:lumOff val="25000"/>
+                  </a:schemeClr>
+                </a:solidFill>
+                <a:latin typeface="+mn-lt"/>
+                <a:ea typeface="+mn-ea"/>
+                <a:cs typeface="+mn-cs"/>
+              </a:defRPr>
+            </a:lvl7pPr>
+            <a:lvl8pPr marL="3429000" indent="-228600" algn="l" defTabSz="457200" rtl="0" eaLnBrk="1" latinLnBrk="0" hangingPunct="1">
+              <a:spcBef>
+                <a:spcPts val="1000"/>
+              </a:spcBef>
+              <a:spcAft>
+                <a:spcPts val="0"/>
+              </a:spcAft>
+              <a:buClr>
+                <a:schemeClr val="accent1"/>
+              </a:buClr>
+              <a:buSzPct val="80000"/>
+              <a:buFont typeface="Wingdings 3" charset="2"/>
+              <a:buChar char=""/>
+              <a:defRPr sz="1200" kern="1200">
+                <a:solidFill>
+                  <a:schemeClr val="tx1">
+                    <a:lumMod val="75000"/>
+                    <a:lumOff val="25000"/>
+                  </a:schemeClr>
+                </a:solidFill>
+                <a:latin typeface="+mn-lt"/>
+                <a:ea typeface="+mn-ea"/>
+                <a:cs typeface="+mn-cs"/>
+              </a:defRPr>
+            </a:lvl8pPr>
+            <a:lvl9pPr marL="3886200" indent="-228600" algn="l" defTabSz="457200" rtl="0" eaLnBrk="1" latinLnBrk="0" hangingPunct="1">
+              <a:spcBef>
+                <a:spcPts val="1000"/>
+              </a:spcBef>
+              <a:spcAft>
+                <a:spcPts val="0"/>
+              </a:spcAft>
+              <a:buClr>
+                <a:schemeClr val="accent1"/>
+              </a:buClr>
+              <a:buSzPct val="80000"/>
+              <a:buFont typeface="Wingdings 3" charset="2"/>
+              <a:buChar char=""/>
+              <a:defRPr sz="1200" kern="1200">
+                <a:solidFill>
+                  <a:schemeClr val="tx1">
+                    <a:lumMod val="75000"/>
+                    <a:lumOff val="25000"/>
+                  </a:schemeClr>
+                </a:solidFill>
+                <a:latin typeface="+mn-lt"/>
+                <a:ea typeface="+mn-ea"/>
+                <a:cs typeface="+mn-cs"/>
+              </a:defRPr>
+            </a:lvl9pPr>
+          </a:lstStyle>
+          <a:p>
             <a:pPr marL="0" indent="0">
               <a:buNone/>
             </a:pPr>
@@ -9842,11 +10003,11 @@
             </a:r>
             <a:r>
               <a:rPr lang="en-US" sz="2400" dirty="0"/>
-              <a:t>is the probability of getting an obtained value or a more extreme value assuming the null hypothesis is </a:t>
+              <a:t>is the probability of </a:t>
             </a:r>
             <a:r>
               <a:rPr lang="en-US" sz="2400" dirty="0" smtClean="0"/>
-              <a:t>true.</a:t>
+              <a:t>observing a result equal to, or as extreme as the actual value observed, assuming the null hypothesis is true.</a:t>
             </a:r>
           </a:p>
         </p:txBody>

</xml_diff>

<commit_message>
Replaced the sample/population figure.
</commit_message>
<xml_diff>
--- a/_toothpaste/toothpaste_story_clinic.pptx
+++ b/_toothpaste/toothpaste_story_clinic.pptx
@@ -212,7 +212,7 @@
           <a:p>
             <a:fld id="{AE6EAB43-FDD5-4DA5-A2FD-96DC022D7B5C}" type="datetimeFigureOut">
               <a:rPr lang="en-US" smtClean="0"/>
-              <a:t>6/12/2019</a:t>
+              <a:t>6/13/2019</a:t>
             </a:fld>
             <a:endParaRPr lang="en-US"/>
           </a:p>
@@ -614,11 +614,7 @@
             </a:r>
             <a:r>
               <a:rPr lang="en-US" dirty="0" smtClean="0"/>
-              <a:t> </a:t>
-            </a:r>
-            <a:r>
-              <a:rPr lang="en-US" dirty="0" smtClean="0"/>
-              <a:t>let’s take a look at some data from an actual study.  These</a:t>
+              <a:t> let’s take a look at some data from an actual study.  These</a:t>
             </a:r>
             <a:r>
               <a:rPr lang="en-US" baseline="0" dirty="0" smtClean="0"/>
@@ -642,11 +638,15 @@
             </a:r>
             <a:r>
               <a:rPr lang="en-US" i="0" baseline="0" dirty="0" smtClean="0"/>
-              <a:t>A complete reference is provided at the end of this presentation</a:t>
+              <a:t>A complete reference is provided at the end of this presentation.  As </a:t>
             </a:r>
             <a:r>
               <a:rPr lang="en-US" i="0" baseline="0" dirty="0" smtClean="0"/>
-              <a:t>.  As suggested in the previous slide, we see that these authors selected two indices.  The first measures the participant’s overall gingival health, the second measures gingival bleeding.  Note: smaller numbers are better.</a:t>
+              <a:t>noted in a previous </a:t>
+            </a:r>
+            <a:r>
+              <a:rPr lang="en-US" i="0" baseline="0" dirty="0" smtClean="0"/>
+              <a:t>slide, we see that these authors selected two indices.  The first measures the participant’s overall gingival health, the second measures gingival bleeding.  Note: smaller numbers are better.</a:t>
             </a:r>
             <a:endParaRPr lang="en-US" dirty="0" smtClean="0"/>
           </a:p>
@@ -845,7 +845,6 @@
               <a:rPr lang="en-US" baseline="0" dirty="0" smtClean="0"/>
               <a:t> to arrive at an overall conclusion.  </a:t>
             </a:r>
-            <a:endParaRPr lang="en-US" baseline="0" dirty="0" smtClean="0"/>
           </a:p>
           <a:p>
             <a:endParaRPr lang="en-US" baseline="0" dirty="0" smtClean="0"/>
@@ -863,7 +862,6 @@
               <a:rPr lang="en-US" b="0" baseline="0" dirty="0" smtClean="0"/>
               <a:t>?  Are you ready to recommend that your patient immediately begin using Crest Detoxify?</a:t>
             </a:r>
-            <a:endParaRPr lang="en-US" b="0" baseline="0" dirty="0" smtClean="0"/>
           </a:p>
         </p:txBody>
       </p:sp>
@@ -961,36 +959,24 @@
             </a:r>
             <a:r>
               <a:rPr lang="en-US" baseline="0" dirty="0" smtClean="0"/>
-              <a:t>…  there’s </a:t>
+              <a:t>…  there’s a big gotcha here.  Say “Hello” to </a:t>
             </a:r>
             <a:r>
               <a:rPr lang="en-US" baseline="0" dirty="0" smtClean="0"/>
-              <a:t>a big gotcha here.  </a:t>
+              <a:t>the Variance </a:t>
             </a:r>
             <a:r>
               <a:rPr lang="en-US" baseline="0" dirty="0" smtClean="0"/>
-              <a:t>Say “Hello” to the Chance &amp; Variance Monster.  Here’s </a:t>
-            </a:r>
+              <a:t>Monster.  Here’s the problem.  Earlier, we divided our sample into control and treatment groups.  Each group then became a sub-sample, representing either the population of those who use Crest Detoxify or the population of those who don’t.  But because of chance, samples vary – sometimes greatly – and provide imprecise estimates of the true population mean.  In other words, chance creates noise, making us less certain of the conclusions we tentatively reached in the last slide.</a:t>
+            </a:r>
+          </a:p>
+          <a:p>
+            <a:endParaRPr lang="en-US" baseline="0" dirty="0" smtClean="0"/>
+          </a:p>
+          <a:p>
             <a:r>
               <a:rPr lang="en-US" baseline="0" dirty="0" smtClean="0"/>
-              <a:t>the problem. </a:t>
-            </a:r>
-            <a:r>
-              <a:rPr lang="en-US" baseline="0" dirty="0" smtClean="0"/>
-              <a:t> Earlier, we divided our sample into control and treatment groups.  Each group then became a sub-sample, representing either the population of those who use Crest Detoxify or the population of those who don’t.  But because of chance, samples vary – sometimes greatly – and provide imprecise estimates of the true population mean.  In other words, chance creates noise, making us less certain of the conclusions we tentatively reached in the last slide.</a:t>
-            </a:r>
-          </a:p>
-          <a:p>
-            <a:endParaRPr lang="en-US" baseline="0" dirty="0" smtClean="0"/>
-          </a:p>
-          <a:p>
-            <a:r>
-              <a:rPr lang="en-US" baseline="0" dirty="0" smtClean="0"/>
-              <a:t>Let’s </a:t>
-            </a:r>
-            <a:r>
-              <a:rPr lang="en-US" baseline="0" dirty="0" smtClean="0"/>
-              <a:t>visualize the problem.  To do so, I’m going to conduct a simulation using a special Excel spreadsheet developed by Geoff Cummings, the author of </a:t>
+              <a:t>Let’s visualize the problem.  To do so, I’m going to conduct a simulation using a special Excel spreadsheet developed by Geoff Cummings, the author of </a:t>
             </a:r>
             <a:r>
               <a:rPr lang="en-US" u="sng" baseline="0" dirty="0" smtClean="0"/>
@@ -1436,23 +1422,7 @@
             </a:pPr>
             <a:r>
               <a:rPr lang="en-US" dirty="0" smtClean="0"/>
-              <a:t>Clearly, what we </a:t>
-            </a:r>
-            <a:r>
-              <a:rPr lang="en-US" dirty="0" smtClean="0"/>
-              <a:t>need </a:t>
-            </a:r>
-            <a:r>
-              <a:rPr lang="en-US" dirty="0" smtClean="0"/>
-              <a:t>is a </a:t>
-            </a:r>
-            <a:r>
-              <a:rPr lang="en-US" dirty="0" smtClean="0"/>
-              <a:t>way to determine if the observed distance between the control and treatment means is large enough </a:t>
-            </a:r>
-            <a:r>
-              <a:rPr lang="en-US" dirty="0" smtClean="0"/>
-              <a:t>to </a:t>
+              <a:t>Clearly, what we need is a way to determine if the observed distance between the control and treatment means is large enough to </a:t>
             </a:r>
             <a:r>
               <a:rPr lang="en-US" baseline="0" dirty="0" smtClean="0"/>
@@ -1476,15 +1446,7 @@
             </a:r>
             <a:r>
               <a:rPr lang="en-US" dirty="0" smtClean="0"/>
-              <a:t>, </a:t>
-            </a:r>
-            <a:r>
-              <a:rPr lang="en-US" dirty="0" smtClean="0"/>
-              <a:t>is it highly unlikely (improbable) that the observed difference </a:t>
-            </a:r>
-            <a:r>
-              <a:rPr lang="en-US" dirty="0" smtClean="0"/>
-              <a:t>between our </a:t>
+              <a:t>, is it highly unlikely (improbable) that the observed difference between our </a:t>
             </a:r>
             <a:r>
               <a:rPr lang="en-US" dirty="0" err="1" smtClean="0"/>
@@ -1496,19 +1458,7 @@
             </a:r>
             <a:r>
               <a:rPr lang="en-US" baseline="0" dirty="0" smtClean="0"/>
-              <a:t> and control groups is due to chance?  In </a:t>
-            </a:r>
-            <a:r>
-              <a:rPr lang="en-US" baseline="0" dirty="0" smtClean="0"/>
-              <a:t>the case of traditional NHST, this is done by calculating a p-value.  However, this leads to binary (yes/no) thinking.  P is significant, typically less than .05, or it isn’t – in which case a research journal will probably not publish the findings. </a:t>
-            </a:r>
-            <a:r>
-              <a:rPr lang="en-US" baseline="0" dirty="0" smtClean="0"/>
-              <a:t>And, </a:t>
-            </a:r>
-            <a:r>
-              <a:rPr lang="en-US" baseline="0" dirty="0" smtClean="0"/>
-              <a:t>as we saw in our first ESCI simulation, a point estimate can vary greatly, thanks to chance.  The problem is that NHST gives us an illusion of certainty whereas the reality is much more nuanced.  </a:t>
+              <a:t> and control groups is due to chance?  In the case of traditional NHST, this is done by calculating a p-value.  However, this leads to binary (yes/no) thinking.  P is significant, typically less than .05, or it isn’t – in which case a research journal will probably not publish the findings. And, as we saw in our first ESCI simulation, a point estimate can vary greatly, thanks to chance.  The problem is that NHST gives us an illusion of certainty whereas the reality is much more nuanced.  </a:t>
             </a:r>
           </a:p>
           <a:p>
@@ -3589,7 +3539,7 @@
           <a:p>
             <a:fld id="{96DFF08F-DC6B-4601-B491-B0F83F6DD2DA}" type="datetimeFigureOut">
               <a:rPr lang="en-US" smtClean="0"/>
-              <a:t>6/12/2019</a:t>
+              <a:t>6/13/2019</a:t>
             </a:fld>
             <a:endParaRPr lang="en-US" dirty="0"/>
           </a:p>
@@ -3841,7 +3791,7 @@
             <a:fld id="{96DFF08F-DC6B-4601-B491-B0F83F6DD2DA}" type="datetimeFigureOut">
               <a:rPr lang="en-US" smtClean="0"/>
               <a:pPr/>
-              <a:t>6/12/2019</a:t>
+              <a:t>6/13/2019</a:t>
             </a:fld>
             <a:endParaRPr lang="en-US" dirty="0"/>
           </a:p>
@@ -4157,7 +4107,7 @@
             <a:fld id="{96DFF08F-DC6B-4601-B491-B0F83F6DD2DA}" type="datetimeFigureOut">
               <a:rPr lang="en-US" smtClean="0"/>
               <a:pPr/>
-              <a:t>6/12/2019</a:t>
+              <a:t>6/13/2019</a:t>
             </a:fld>
             <a:endParaRPr lang="en-US" dirty="0"/>
           </a:p>
@@ -4492,7 +4442,7 @@
             <a:fld id="{96DFF08F-DC6B-4601-B491-B0F83F6DD2DA}" type="datetimeFigureOut">
               <a:rPr lang="en-US" smtClean="0"/>
               <a:pPr/>
-              <a:t>6/12/2019</a:t>
+              <a:t>6/13/2019</a:t>
             </a:fld>
             <a:endParaRPr lang="en-US" dirty="0"/>
           </a:p>
@@ -4808,7 +4758,7 @@
             <a:fld id="{96DFF08F-DC6B-4601-B491-B0F83F6DD2DA}" type="datetimeFigureOut">
               <a:rPr lang="en-US" smtClean="0"/>
               <a:pPr/>
-              <a:t>6/12/2019</a:t>
+              <a:t>6/13/2019</a:t>
             </a:fld>
             <a:endParaRPr lang="en-US" dirty="0"/>
           </a:p>
@@ -5203,7 +5153,7 @@
             <a:fld id="{96DFF08F-DC6B-4601-B491-B0F83F6DD2DA}" type="datetimeFigureOut">
               <a:rPr lang="en-US" smtClean="0"/>
               <a:pPr/>
-              <a:t>6/12/2019</a:t>
+              <a:t>6/13/2019</a:t>
             </a:fld>
             <a:endParaRPr lang="en-US" dirty="0"/>
           </a:p>
@@ -5374,7 +5324,7 @@
           <a:p>
             <a:fld id="{96DFF08F-DC6B-4601-B491-B0F83F6DD2DA}" type="datetimeFigureOut">
               <a:rPr lang="en-US" smtClean="0"/>
-              <a:t>6/12/2019</a:t>
+              <a:t>6/13/2019</a:t>
             </a:fld>
             <a:endParaRPr lang="en-US" dirty="0"/>
           </a:p>
@@ -5554,7 +5504,7 @@
           <a:p>
             <a:fld id="{96DFF08F-DC6B-4601-B491-B0F83F6DD2DA}" type="datetimeFigureOut">
               <a:rPr lang="en-US" smtClean="0"/>
-              <a:t>6/12/2019</a:t>
+              <a:t>6/13/2019</a:t>
             </a:fld>
             <a:endParaRPr lang="en-US" dirty="0"/>
           </a:p>
@@ -5724,7 +5674,7 @@
           <a:p>
             <a:fld id="{96DFF08F-DC6B-4601-B491-B0F83F6DD2DA}" type="datetimeFigureOut">
               <a:rPr lang="en-US" smtClean="0"/>
-              <a:t>6/12/2019</a:t>
+              <a:t>6/13/2019</a:t>
             </a:fld>
             <a:endParaRPr lang="en-US" dirty="0"/>
           </a:p>
@@ -5971,7 +5921,7 @@
           <a:p>
             <a:fld id="{96DFF08F-DC6B-4601-B491-B0F83F6DD2DA}" type="datetimeFigureOut">
               <a:rPr lang="en-US" smtClean="0"/>
-              <a:t>6/12/2019</a:t>
+              <a:t>6/13/2019</a:t>
             </a:fld>
             <a:endParaRPr lang="en-US" dirty="0"/>
           </a:p>
@@ -6203,7 +6153,7 @@
           <a:p>
             <a:fld id="{96DFF08F-DC6B-4601-B491-B0F83F6DD2DA}" type="datetimeFigureOut">
               <a:rPr lang="en-US" smtClean="0"/>
-              <a:t>6/12/2019</a:t>
+              <a:t>6/13/2019</a:t>
             </a:fld>
             <a:endParaRPr lang="en-US" dirty="0"/>
           </a:p>
@@ -6577,7 +6527,7 @@
           <a:p>
             <a:fld id="{96DFF08F-DC6B-4601-B491-B0F83F6DD2DA}" type="datetimeFigureOut">
               <a:rPr lang="en-US" smtClean="0"/>
-              <a:t>6/12/2019</a:t>
+              <a:t>6/13/2019</a:t>
             </a:fld>
             <a:endParaRPr lang="en-US" dirty="0"/>
           </a:p>
@@ -6700,7 +6650,7 @@
           <a:p>
             <a:fld id="{96DFF08F-DC6B-4601-B491-B0F83F6DD2DA}" type="datetimeFigureOut">
               <a:rPr lang="en-US" smtClean="0"/>
-              <a:t>6/12/2019</a:t>
+              <a:t>6/13/2019</a:t>
             </a:fld>
             <a:endParaRPr lang="en-US" dirty="0"/>
           </a:p>
@@ -6795,7 +6745,7 @@
           <a:p>
             <a:fld id="{96DFF08F-DC6B-4601-B491-B0F83F6DD2DA}" type="datetimeFigureOut">
               <a:rPr lang="en-US" smtClean="0"/>
-              <a:t>6/12/2019</a:t>
+              <a:t>6/13/2019</a:t>
             </a:fld>
             <a:endParaRPr lang="en-US" dirty="0"/>
           </a:p>
@@ -7050,7 +7000,7 @@
           <a:p>
             <a:fld id="{96DFF08F-DC6B-4601-B491-B0F83F6DD2DA}" type="datetimeFigureOut">
               <a:rPr lang="en-US" smtClean="0"/>
-              <a:t>6/12/2019</a:t>
+              <a:t>6/13/2019</a:t>
             </a:fld>
             <a:endParaRPr lang="en-US" dirty="0"/>
           </a:p>
@@ -7355,7 +7305,7 @@
           <a:p>
             <a:fld id="{96DFF08F-DC6B-4601-B491-B0F83F6DD2DA}" type="datetimeFigureOut">
               <a:rPr lang="en-US" smtClean="0"/>
-              <a:t>6/12/2019</a:t>
+              <a:t>6/13/2019</a:t>
             </a:fld>
             <a:endParaRPr lang="en-US" dirty="0"/>
           </a:p>
@@ -8058,7 +8008,7 @@
             <a:fld id="{96DFF08F-DC6B-4601-B491-B0F83F6DD2DA}" type="datetimeFigureOut">
               <a:rPr lang="en-US" smtClean="0"/>
               <a:pPr/>
-              <a:t>6/12/2019</a:t>
+              <a:t>6/13/2019</a:t>
             </a:fld>
             <a:endParaRPr lang="en-US" dirty="0"/>
           </a:p>
@@ -9004,7 +8954,7 @@
         </p:spPr>
         <p:txBody>
           <a:bodyPr vert="horz" lIns="91440" tIns="45720" rIns="91440" bIns="45720" rtlCol="0">
-            <a:normAutofit fontScale="85000" lnSpcReduction="10000"/>
+            <a:normAutofit/>
           </a:bodyPr>
           <a:lstStyle>
             <a:lvl1pPr marL="342900" indent="-342900" algn="l" defTabSz="457200" rtl="0" eaLnBrk="1" latinLnBrk="0" hangingPunct="1">
@@ -9243,7 +9193,23 @@
                   <a:srgbClr val="00B0F0"/>
                 </a:solidFill>
               </a:rPr>
-              <a:t>Say “Hello” to the Chance &amp; Variance Monster</a:t>
+              <a:t>Say “Hello” to </a:t>
+            </a:r>
+            <a:r>
+              <a:rPr lang="en-US" sz="2000" dirty="0" smtClean="0">
+                <a:solidFill>
+                  <a:srgbClr val="00B0F0"/>
+                </a:solidFill>
+              </a:rPr>
+              <a:t>the Variance </a:t>
+            </a:r>
+            <a:r>
+              <a:rPr lang="en-US" sz="2000" dirty="0" smtClean="0">
+                <a:solidFill>
+                  <a:srgbClr val="00B0F0"/>
+                </a:solidFill>
+              </a:rPr>
+              <a:t>Monster</a:t>
             </a:r>
           </a:p>
           <a:p>
@@ -12065,7 +12031,7 @@
       </p:pic>
       <p:pic>
         <p:nvPicPr>
-          <p:cNvPr id="3" name="Picture 2"/>
+          <p:cNvPr id="2" name="Picture 1"/>
           <p:cNvPicPr>
             <a:picLocks noChangeAspect="1"/>
           </p:cNvPicPr>
@@ -12085,8 +12051,8 @@
         </p:blipFill>
         <p:spPr>
           <a:xfrm>
-            <a:off x="2548161" y="1611549"/>
-            <a:ext cx="4709160" cy="3505200"/>
+            <a:off x="2377435" y="930332"/>
+            <a:ext cx="5155574" cy="4883273"/>
           </a:xfrm>
           <a:prstGeom prst="rect">
             <a:avLst/>

</xml_diff>